<commit_message>
Update readme & docs
</commit_message>
<xml_diff>
--- a/Dokumente/Folien.pptx
+++ b/Dokumente/Folien.pptx
@@ -18,12 +18,15 @@
     <p:sldId id="277" r:id="rId12"/>
     <p:sldId id="278" r:id="rId13"/>
     <p:sldId id="268" r:id="rId14"/>
-    <p:sldId id="280" r:id="rId15"/>
-    <p:sldId id="279" r:id="rId16"/>
-    <p:sldId id="269" r:id="rId17"/>
-    <p:sldId id="270" r:id="rId18"/>
-    <p:sldId id="271" r:id="rId19"/>
-    <p:sldId id="272" r:id="rId20"/>
+    <p:sldId id="269" r:id="rId15"/>
+    <p:sldId id="270" r:id="rId16"/>
+    <p:sldId id="279" r:id="rId17"/>
+    <p:sldId id="283" r:id="rId18"/>
+    <p:sldId id="280" r:id="rId19"/>
+    <p:sldId id="281" r:id="rId20"/>
+    <p:sldId id="282" r:id="rId21"/>
+    <p:sldId id="271" r:id="rId22"/>
+    <p:sldId id="272" r:id="rId23"/>
   </p:sldIdLst>
   <p:sldSz cx="9144000" cy="6858000" type="screen4x3"/>
   <p:notesSz cx="6858000" cy="9144000"/>
@@ -320,7 +323,7 @@
           <a:p>
             <a:fld id="{5BCAD085-E8A6-8845-BD4E-CB4CCA059FC4}" type="datetimeFigureOut">
               <a:rPr lang="en-US" smtClean="0"/>
-              <a:t>11/1/25</a:t>
+              <a:t>11/2/25</a:t>
             </a:fld>
             <a:endParaRPr lang="en-US"/>
           </a:p>
@@ -488,7 +491,7 @@
           <a:p>
             <a:fld id="{5BCAD085-E8A6-8845-BD4E-CB4CCA059FC4}" type="datetimeFigureOut">
               <a:rPr lang="en-US" smtClean="0"/>
-              <a:t>11/1/25</a:t>
+              <a:t>11/2/25</a:t>
             </a:fld>
             <a:endParaRPr lang="en-US"/>
           </a:p>
@@ -666,7 +669,7 @@
           <a:p>
             <a:fld id="{5BCAD085-E8A6-8845-BD4E-CB4CCA059FC4}" type="datetimeFigureOut">
               <a:rPr lang="en-US" smtClean="0"/>
-              <a:t>11/1/25</a:t>
+              <a:t>11/2/25</a:t>
             </a:fld>
             <a:endParaRPr lang="en-US"/>
           </a:p>
@@ -834,7 +837,7 @@
           <a:p>
             <a:fld id="{5BCAD085-E8A6-8845-BD4E-CB4CCA059FC4}" type="datetimeFigureOut">
               <a:rPr lang="en-US" smtClean="0"/>
-              <a:t>11/1/25</a:t>
+              <a:t>11/2/25</a:t>
             </a:fld>
             <a:endParaRPr lang="en-US"/>
           </a:p>
@@ -1079,7 +1082,7 @@
           <a:p>
             <a:fld id="{5BCAD085-E8A6-8845-BD4E-CB4CCA059FC4}" type="datetimeFigureOut">
               <a:rPr lang="en-US" smtClean="0"/>
-              <a:t>11/1/25</a:t>
+              <a:t>11/2/25</a:t>
             </a:fld>
             <a:endParaRPr lang="en-US"/>
           </a:p>
@@ -1364,7 +1367,7 @@
           <a:p>
             <a:fld id="{5BCAD085-E8A6-8845-BD4E-CB4CCA059FC4}" type="datetimeFigureOut">
               <a:rPr lang="en-US" smtClean="0"/>
-              <a:t>11/1/25</a:t>
+              <a:t>11/2/25</a:t>
             </a:fld>
             <a:endParaRPr lang="en-US"/>
           </a:p>
@@ -1783,7 +1786,7 @@
           <a:p>
             <a:fld id="{5BCAD085-E8A6-8845-BD4E-CB4CCA059FC4}" type="datetimeFigureOut">
               <a:rPr lang="en-US" smtClean="0"/>
-              <a:t>11/1/25</a:t>
+              <a:t>11/2/25</a:t>
             </a:fld>
             <a:endParaRPr lang="en-US"/>
           </a:p>
@@ -1900,7 +1903,7 @@
           <a:p>
             <a:fld id="{5BCAD085-E8A6-8845-BD4E-CB4CCA059FC4}" type="datetimeFigureOut">
               <a:rPr lang="en-US" smtClean="0"/>
-              <a:t>11/1/25</a:t>
+              <a:t>11/2/25</a:t>
             </a:fld>
             <a:endParaRPr lang="en-US"/>
           </a:p>
@@ -1995,7 +1998,7 @@
           <a:p>
             <a:fld id="{5BCAD085-E8A6-8845-BD4E-CB4CCA059FC4}" type="datetimeFigureOut">
               <a:rPr lang="en-US" smtClean="0"/>
-              <a:t>11/1/25</a:t>
+              <a:t>11/2/25</a:t>
             </a:fld>
             <a:endParaRPr lang="en-US"/>
           </a:p>
@@ -2270,7 +2273,7 @@
           <a:p>
             <a:fld id="{5BCAD085-E8A6-8845-BD4E-CB4CCA059FC4}" type="datetimeFigureOut">
               <a:rPr lang="en-US" smtClean="0"/>
-              <a:t>11/1/25</a:t>
+              <a:t>11/2/25</a:t>
             </a:fld>
             <a:endParaRPr lang="en-US"/>
           </a:p>
@@ -2522,7 +2525,7 @@
           <a:p>
             <a:fld id="{5BCAD085-E8A6-8845-BD4E-CB4CCA059FC4}" type="datetimeFigureOut">
               <a:rPr lang="en-US" smtClean="0"/>
-              <a:t>11/1/25</a:t>
+              <a:t>11/2/25</a:t>
             </a:fld>
             <a:endParaRPr lang="en-US"/>
           </a:p>
@@ -2733,7 +2736,7 @@
           <a:p>
             <a:fld id="{5BCAD085-E8A6-8845-BD4E-CB4CCA059FC4}" type="datetimeFigureOut">
               <a:rPr lang="en-US" smtClean="0"/>
-              <a:t>11/1/25</a:t>
+              <a:t>11/2/25</a:t>
             </a:fld>
             <a:endParaRPr lang="en-US"/>
           </a:p>
@@ -3229,7 +3232,11 @@
                 <a:ea typeface="ADLaM Display" panose="02010000000000000000" pitchFamily="2" charset="77"/>
                 <a:cs typeface="ADLaM Display" panose="02010000000000000000" pitchFamily="2" charset="77"/>
               </a:rPr>
-              <a:t>Ein Workshop mit Programmierung &amp; KI</a:t>
+              <a:t>Ein Workshop mit Programmierung &amp; KI </a:t>
+            </a:r>
+            <a:r>
+              <a:rPr lang="de-DE" dirty="0"/>
+              <a:t>🤖</a:t>
             </a:r>
             <a:endParaRPr b="0" dirty="0">
               <a:latin typeface="Trebuchet MS" panose="020B0703020202090204" pitchFamily="34" charset="0"/>
@@ -3289,78 +3296,6 @@
           </a:p>
         </p:txBody>
       </p:sp>
-      <p:pic>
-        <p:nvPicPr>
-          <p:cNvPr id="8" name="Grafik 7" descr="Geöffnetes Laptop-Gerät">
-            <a:extLst>
-              <a:ext uri="{FF2B5EF4-FFF2-40B4-BE49-F238E27FC236}">
-                <a16:creationId xmlns:a16="http://schemas.microsoft.com/office/drawing/2014/main" id="{5938E127-9F51-C57B-8380-5BE35AE303ED}"/>
-              </a:ext>
-            </a:extLst>
-          </p:cNvPr>
-          <p:cNvPicPr>
-            <a:picLocks noChangeAspect="1"/>
-          </p:cNvPicPr>
-          <p:nvPr/>
-        </p:nvPicPr>
-        <p:blipFill>
-          <a:blip r:embed="rId2">
-            <a:extLst>
-              <a:ext uri="{96DAC541-7B7A-43D3-8B79-37D633B846F1}">
-                <asvg:svgBlip xmlns:asvg="http://schemas.microsoft.com/office/drawing/2016/SVG/main" r:embed="rId3"/>
-              </a:ext>
-            </a:extLst>
-          </a:blip>
-          <a:stretch>
-            <a:fillRect/>
-          </a:stretch>
-        </p:blipFill>
-        <p:spPr>
-          <a:xfrm>
-            <a:off x="6896100" y="4055241"/>
-            <a:ext cx="1790700" cy="1270000"/>
-          </a:xfrm>
-          <a:prstGeom prst="rect">
-            <a:avLst/>
-          </a:prstGeom>
-        </p:spPr>
-      </p:pic>
-      <p:pic>
-        <p:nvPicPr>
-          <p:cNvPr id="10" name="Grafik 9" descr="Ein Wasserball">
-            <a:extLst>
-              <a:ext uri="{FF2B5EF4-FFF2-40B4-BE49-F238E27FC236}">
-                <a16:creationId xmlns:a16="http://schemas.microsoft.com/office/drawing/2014/main" id="{D302579B-BFD7-9552-8735-81F1EF60B460}"/>
-              </a:ext>
-            </a:extLst>
-          </p:cNvPr>
-          <p:cNvPicPr>
-            <a:picLocks noChangeAspect="1"/>
-          </p:cNvPicPr>
-          <p:nvPr/>
-        </p:nvPicPr>
-        <p:blipFill>
-          <a:blip r:embed="rId4">
-            <a:extLst>
-              <a:ext uri="{96DAC541-7B7A-43D3-8B79-37D633B846F1}">
-                <asvg:svgBlip xmlns:asvg="http://schemas.microsoft.com/office/drawing/2016/SVG/main" r:embed="rId5"/>
-              </a:ext>
-            </a:extLst>
-          </a:blip>
-          <a:stretch>
-            <a:fillRect/>
-          </a:stretch>
-        </p:blipFill>
-        <p:spPr>
-          <a:xfrm>
-            <a:off x="326478" y="3573517"/>
-            <a:ext cx="2233448" cy="2233448"/>
-          </a:xfrm>
-          <a:prstGeom prst="rect">
-            <a:avLst/>
-          </a:prstGeom>
-        </p:spPr>
-      </p:pic>
     </p:spTree>
   </p:cSld>
   <p:clrMapOvr>
@@ -3652,6 +3587,81 @@
   <p:clrMapOvr>
     <a:masterClrMapping/>
   </p:clrMapOvr>
+  <p:timing>
+    <p:tnLst>
+      <p:par>
+        <p:cTn id="1" dur="indefinite" restart="never" nodeType="tmRoot">
+          <p:childTnLst>
+            <p:seq concurrent="1" nextAc="seek">
+              <p:cTn id="2" dur="indefinite" nodeType="mainSeq">
+                <p:childTnLst>
+                  <p:par>
+                    <p:cTn id="3" fill="hold">
+                      <p:stCondLst>
+                        <p:cond delay="indefinite"/>
+                      </p:stCondLst>
+                      <p:childTnLst>
+                        <p:par>
+                          <p:cTn id="4" fill="hold">
+                            <p:stCondLst>
+                              <p:cond delay="0"/>
+                            </p:stCondLst>
+                            <p:childTnLst>
+                              <p:par>
+                                <p:cTn id="5" presetID="1" presetClass="entr" presetSubtype="0" fill="hold" nodeType="clickEffect">
+                                  <p:stCondLst>
+                                    <p:cond delay="0"/>
+                                  </p:stCondLst>
+                                  <p:childTnLst>
+                                    <p:set>
+                                      <p:cBhvr>
+                                        <p:cTn id="6" dur="1" fill="hold">
+                                          <p:stCondLst>
+                                            <p:cond delay="0"/>
+                                          </p:stCondLst>
+                                        </p:cTn>
+                                        <p:tgtEl>
+                                          <p:spTgt spid="5"/>
+                                        </p:tgtEl>
+                                        <p:attrNameLst>
+                                          <p:attrName>style.visibility</p:attrName>
+                                        </p:attrNameLst>
+                                      </p:cBhvr>
+                                      <p:to>
+                                        <p:strVal val="visible"/>
+                                      </p:to>
+                                    </p:set>
+                                  </p:childTnLst>
+                                </p:cTn>
+                              </p:par>
+                            </p:childTnLst>
+                          </p:cTn>
+                        </p:par>
+                      </p:childTnLst>
+                    </p:cTn>
+                  </p:par>
+                </p:childTnLst>
+              </p:cTn>
+              <p:prevCondLst>
+                <p:cond evt="onPrev" delay="0">
+                  <p:tgtEl>
+                    <p:sldTgt/>
+                  </p:tgtEl>
+                </p:cond>
+              </p:prevCondLst>
+              <p:nextCondLst>
+                <p:cond evt="onNext" delay="0">
+                  <p:tgtEl>
+                    <p:sldTgt/>
+                  </p:tgtEl>
+                </p:cond>
+              </p:nextCondLst>
+            </p:seq>
+          </p:childTnLst>
+        </p:cTn>
+      </p:par>
+    </p:tnLst>
+  </p:timing>
 </p:sld>
 </file>
 
@@ -3935,7 +3945,7 @@
               <a:rPr lang="de-DE" dirty="0">
                 <a:latin typeface="Trebuchet MS" panose="020B0703020202090204" pitchFamily="34" charset="0"/>
               </a:rPr>
-              <a:t>“Erstelle ein Jump &amp; Run in JavaScript mit p5“</a:t>
+              <a:t>“Erstelle ein Jump &amp; Run“</a:t>
             </a:r>
             <a:endParaRPr b="0" dirty="0">
               <a:latin typeface="Trebuchet MS" panose="020B0703020202090204" pitchFamily="34" charset="0"/>
@@ -4004,6 +4014,1075 @@
 </file>
 
 <file path=ppt/slides/slide14.xml><?xml version="1.0" encoding="utf-8"?>
+<p:sld xmlns:a="http://schemas.openxmlformats.org/drawingml/2006/main" xmlns:r="http://schemas.openxmlformats.org/officeDocument/2006/relationships" xmlns:p="http://schemas.openxmlformats.org/presentationml/2006/main">
+  <p:cSld>
+    <p:bg>
+      <p:bgPr>
+        <a:solidFill>
+          <a:srgbClr val="E6F0FF"/>
+        </a:solidFill>
+        <a:effectLst/>
+      </p:bgPr>
+    </p:bg>
+    <p:spTree>
+      <p:nvGrpSpPr>
+        <p:cNvPr id="1" name=""/>
+        <p:cNvGrpSpPr/>
+        <p:nvPr/>
+      </p:nvGrpSpPr>
+      <p:grpSpPr>
+        <a:xfrm>
+          <a:off x="0" y="0"/>
+          <a:ext cx="0" cy="0"/>
+          <a:chOff x="0" y="0"/>
+          <a:chExt cx="0" cy="0"/>
+        </a:xfrm>
+      </p:grpSpPr>
+      <p:sp>
+        <p:nvSpPr>
+          <p:cNvPr id="2" name="Title 1"/>
+          <p:cNvSpPr>
+            <a:spLocks noGrp="1"/>
+          </p:cNvSpPr>
+          <p:nvPr>
+            <p:ph type="title"/>
+          </p:nvPr>
+        </p:nvSpPr>
+        <p:spPr/>
+        <p:txBody>
+          <a:bodyPr/>
+          <a:lstStyle/>
+          <a:p>
+            <a:pPr>
+              <a:defRPr sz="2400">
+                <a:solidFill>
+                  <a:srgbClr val="28283C"/>
+                </a:solidFill>
+                <a:latin typeface="Comic Sans MS"/>
+              </a:defRPr>
+            </a:pPr>
+            <a:r>
+              <a:rPr b="0" dirty="0" err="1">
+                <a:latin typeface="Trebuchet MS" panose="020B0703020202090204" pitchFamily="34" charset="0"/>
+              </a:rPr>
+              <a:t>Euer</a:t>
+            </a:r>
+            <a:r>
+              <a:rPr b="0" dirty="0">
+                <a:latin typeface="Trebuchet MS" panose="020B0703020202090204" pitchFamily="34" charset="0"/>
+              </a:rPr>
+              <a:t> Projekt 🚀</a:t>
+            </a:r>
+          </a:p>
+        </p:txBody>
+      </p:sp>
+      <p:sp>
+        <p:nvSpPr>
+          <p:cNvPr id="3" name="Content Placeholder 2"/>
+          <p:cNvSpPr>
+            <a:spLocks noGrp="1"/>
+          </p:cNvSpPr>
+          <p:nvPr>
+            <p:ph idx="1"/>
+          </p:nvPr>
+        </p:nvSpPr>
+        <p:spPr/>
+        <p:txBody>
+          <a:bodyPr/>
+          <a:lstStyle/>
+          <a:p>
+            <a:pPr algn="l">
+              <a:defRPr sz="2400">
+                <a:solidFill>
+                  <a:srgbClr val="28283C"/>
+                </a:solidFill>
+                <a:latin typeface="Comic Sans MS"/>
+              </a:defRPr>
+            </a:pPr>
+            <a:r>
+              <a:rPr b="0" dirty="0">
+                <a:latin typeface="Trebuchet MS" panose="020B0703020202090204" pitchFamily="34" charset="0"/>
+              </a:rPr>
+              <a:t>1️⃣ </a:t>
+            </a:r>
+            <a:r>
+              <a:rPr b="0" dirty="0" err="1">
+                <a:latin typeface="Trebuchet MS" panose="020B0703020202090204" pitchFamily="34" charset="0"/>
+              </a:rPr>
+              <a:t>Wählt</a:t>
+            </a:r>
+            <a:r>
+              <a:rPr b="0" dirty="0">
+                <a:latin typeface="Trebuchet MS" panose="020B0703020202090204" pitchFamily="34" charset="0"/>
+              </a:rPr>
+              <a:t>: Ball-Spiel </a:t>
+            </a:r>
+            <a:r>
+              <a:rPr b="0" dirty="0" err="1">
+                <a:latin typeface="Trebuchet MS" panose="020B0703020202090204" pitchFamily="34" charset="0"/>
+              </a:rPr>
+              <a:t>oder</a:t>
+            </a:r>
+            <a:r>
+              <a:rPr b="0" dirty="0">
+                <a:latin typeface="Trebuchet MS" panose="020B0703020202090204" pitchFamily="34" charset="0"/>
+              </a:rPr>
+              <a:t> </a:t>
+            </a:r>
+            <a:r>
+              <a:rPr lang="de-DE" b="0" dirty="0">
+                <a:latin typeface="Trebuchet MS" panose="020B0703020202090204" pitchFamily="34" charset="0"/>
+              </a:rPr>
+              <a:t>Jump &amp; Run als Basis</a:t>
+            </a:r>
+            <a:endParaRPr b="0" dirty="0">
+              <a:latin typeface="Trebuchet MS" panose="020B0703020202090204" pitchFamily="34" charset="0"/>
+            </a:endParaRPr>
+          </a:p>
+          <a:p>
+            <a:pPr algn="l">
+              <a:defRPr sz="2400">
+                <a:solidFill>
+                  <a:srgbClr val="28283C"/>
+                </a:solidFill>
+                <a:latin typeface="Comic Sans MS"/>
+              </a:defRPr>
+            </a:pPr>
+            <a:r>
+              <a:rPr b="0" dirty="0">
+                <a:latin typeface="Trebuchet MS" panose="020B0703020202090204" pitchFamily="34" charset="0"/>
+              </a:rPr>
+              <a:t>2️⃣ </a:t>
+            </a:r>
+            <a:r>
+              <a:rPr b="0" dirty="0" err="1">
+                <a:latin typeface="Trebuchet MS" panose="020B0703020202090204" pitchFamily="34" charset="0"/>
+              </a:rPr>
+              <a:t>Überlegt</a:t>
+            </a:r>
+            <a:r>
+              <a:rPr b="0" dirty="0">
+                <a:latin typeface="Trebuchet MS" panose="020B0703020202090204" pitchFamily="34" charset="0"/>
+              </a:rPr>
+              <a:t>, was </a:t>
+            </a:r>
+            <a:r>
+              <a:rPr b="0" dirty="0" err="1">
+                <a:latin typeface="Trebuchet MS" panose="020B0703020202090204" pitchFamily="34" charset="0"/>
+              </a:rPr>
+              <a:t>euer</a:t>
+            </a:r>
+            <a:r>
+              <a:rPr b="0" dirty="0">
+                <a:latin typeface="Trebuchet MS" panose="020B0703020202090204" pitchFamily="34" charset="0"/>
+              </a:rPr>
+              <a:t> Spiel </a:t>
+            </a:r>
+            <a:r>
+              <a:rPr b="0" dirty="0" err="1">
+                <a:latin typeface="Trebuchet MS" panose="020B0703020202090204" pitchFamily="34" charset="0"/>
+              </a:rPr>
+              <a:t>können</a:t>
+            </a:r>
+            <a:r>
+              <a:rPr b="0" dirty="0">
+                <a:latin typeface="Trebuchet MS" panose="020B0703020202090204" pitchFamily="34" charset="0"/>
+              </a:rPr>
+              <a:t> </a:t>
+            </a:r>
+            <a:r>
+              <a:rPr b="0" dirty="0" err="1">
+                <a:latin typeface="Trebuchet MS" panose="020B0703020202090204" pitchFamily="34" charset="0"/>
+              </a:rPr>
+              <a:t>soll</a:t>
+            </a:r>
+            <a:endParaRPr b="0" dirty="0">
+              <a:latin typeface="Trebuchet MS" panose="020B0703020202090204" pitchFamily="34" charset="0"/>
+            </a:endParaRPr>
+          </a:p>
+          <a:p>
+            <a:pPr algn="l">
+              <a:defRPr sz="2400">
+                <a:solidFill>
+                  <a:srgbClr val="28283C"/>
+                </a:solidFill>
+                <a:latin typeface="Comic Sans MS"/>
+              </a:defRPr>
+            </a:pPr>
+            <a:r>
+              <a:rPr b="0" dirty="0">
+                <a:latin typeface="Trebuchet MS" panose="020B0703020202090204" pitchFamily="34" charset="0"/>
+              </a:rPr>
+              <a:t>3️⃣ </a:t>
+            </a:r>
+            <a:r>
+              <a:rPr b="0" dirty="0" err="1">
+                <a:latin typeface="Trebuchet MS" panose="020B0703020202090204" pitchFamily="34" charset="0"/>
+              </a:rPr>
+              <a:t>Nutzt</a:t>
+            </a:r>
+            <a:r>
+              <a:rPr b="0" dirty="0">
+                <a:latin typeface="Trebuchet MS" panose="020B0703020202090204" pitchFamily="34" charset="0"/>
+              </a:rPr>
+              <a:t> KI, um Ideen </a:t>
+            </a:r>
+            <a:r>
+              <a:rPr b="0" dirty="0" err="1">
+                <a:latin typeface="Trebuchet MS" panose="020B0703020202090204" pitchFamily="34" charset="0"/>
+              </a:rPr>
+              <a:t>umzusetzen</a:t>
+            </a:r>
+            <a:endParaRPr b="0" dirty="0">
+              <a:latin typeface="Trebuchet MS" panose="020B0703020202090204" pitchFamily="34" charset="0"/>
+            </a:endParaRPr>
+          </a:p>
+          <a:p>
+            <a:pPr algn="l">
+              <a:defRPr sz="2400">
+                <a:solidFill>
+                  <a:srgbClr val="28283C"/>
+                </a:solidFill>
+                <a:latin typeface="Comic Sans MS"/>
+              </a:defRPr>
+            </a:pPr>
+            <a:r>
+              <a:rPr b="0" dirty="0">
+                <a:latin typeface="Trebuchet MS" panose="020B0703020202090204" pitchFamily="34" charset="0"/>
+              </a:rPr>
+              <a:t>4️⃣ </a:t>
+            </a:r>
+            <a:r>
+              <a:rPr b="0" dirty="0" err="1">
+                <a:latin typeface="Trebuchet MS" panose="020B0703020202090204" pitchFamily="34" charset="0"/>
+              </a:rPr>
+              <a:t>Testet</a:t>
+            </a:r>
+            <a:r>
+              <a:rPr b="0" dirty="0">
+                <a:latin typeface="Trebuchet MS" panose="020B0703020202090204" pitchFamily="34" charset="0"/>
+              </a:rPr>
+              <a:t> und </a:t>
+            </a:r>
+            <a:r>
+              <a:rPr b="0" dirty="0" err="1">
+                <a:latin typeface="Trebuchet MS" panose="020B0703020202090204" pitchFamily="34" charset="0"/>
+              </a:rPr>
+              <a:t>verbessert</a:t>
+            </a:r>
+            <a:r>
+              <a:rPr b="0" dirty="0">
+                <a:latin typeface="Trebuchet MS" panose="020B0703020202090204" pitchFamily="34" charset="0"/>
+              </a:rPr>
+              <a:t> </a:t>
+            </a:r>
+            <a:r>
+              <a:rPr b="0" dirty="0" err="1">
+                <a:latin typeface="Trebuchet MS" panose="020B0703020202090204" pitchFamily="34" charset="0"/>
+              </a:rPr>
+              <a:t>gemeinsam</a:t>
+            </a:r>
+            <a:endParaRPr b="0" dirty="0">
+              <a:latin typeface="Trebuchet MS" panose="020B0703020202090204" pitchFamily="34" charset="0"/>
+            </a:endParaRPr>
+          </a:p>
+        </p:txBody>
+      </p:sp>
+    </p:spTree>
+  </p:cSld>
+  <p:clrMapOvr>
+    <a:masterClrMapping/>
+  </p:clrMapOvr>
+</p:sld>
+</file>
+
+<file path=ppt/slides/slide15.xml><?xml version="1.0" encoding="utf-8"?>
+<p:sld xmlns:a="http://schemas.openxmlformats.org/drawingml/2006/main" xmlns:r="http://schemas.openxmlformats.org/officeDocument/2006/relationships" xmlns:p="http://schemas.openxmlformats.org/presentationml/2006/main">
+  <p:cSld>
+    <p:bg>
+      <p:bgPr>
+        <a:solidFill>
+          <a:srgbClr val="E6F0FF"/>
+        </a:solidFill>
+        <a:effectLst/>
+      </p:bgPr>
+    </p:bg>
+    <p:spTree>
+      <p:nvGrpSpPr>
+        <p:cNvPr id="1" name=""/>
+        <p:cNvGrpSpPr/>
+        <p:nvPr/>
+      </p:nvGrpSpPr>
+      <p:grpSpPr>
+        <a:xfrm>
+          <a:off x="0" y="0"/>
+          <a:ext cx="0" cy="0"/>
+          <a:chOff x="0" y="0"/>
+          <a:chExt cx="0" cy="0"/>
+        </a:xfrm>
+      </p:grpSpPr>
+      <p:sp>
+        <p:nvSpPr>
+          <p:cNvPr id="2" name="Title 1"/>
+          <p:cNvSpPr>
+            <a:spLocks noGrp="1"/>
+          </p:cNvSpPr>
+          <p:nvPr>
+            <p:ph type="title"/>
+          </p:nvPr>
+        </p:nvSpPr>
+        <p:spPr/>
+        <p:txBody>
+          <a:bodyPr/>
+          <a:lstStyle/>
+          <a:p>
+            <a:pPr>
+              <a:defRPr sz="2400">
+                <a:solidFill>
+                  <a:srgbClr val="28283C"/>
+                </a:solidFill>
+                <a:latin typeface="Comic Sans MS"/>
+              </a:defRPr>
+            </a:pPr>
+            <a:r>
+              <a:rPr b="0" dirty="0">
+                <a:latin typeface="Trebuchet MS" panose="020B0703020202090204" pitchFamily="34" charset="0"/>
+              </a:rPr>
+              <a:t>Ideen für </a:t>
+            </a:r>
+            <a:r>
+              <a:rPr b="0" dirty="0" err="1">
+                <a:latin typeface="Trebuchet MS" panose="020B0703020202090204" pitchFamily="34" charset="0"/>
+              </a:rPr>
+              <a:t>euer</a:t>
+            </a:r>
+            <a:r>
+              <a:rPr b="0" dirty="0">
+                <a:latin typeface="Trebuchet MS" panose="020B0703020202090204" pitchFamily="34" charset="0"/>
+              </a:rPr>
+              <a:t> Spiel 🌟</a:t>
+            </a:r>
+          </a:p>
+        </p:txBody>
+      </p:sp>
+      <p:sp>
+        <p:nvSpPr>
+          <p:cNvPr id="3" name="Content Placeholder 2"/>
+          <p:cNvSpPr>
+            <a:spLocks noGrp="1"/>
+          </p:cNvSpPr>
+          <p:nvPr>
+            <p:ph idx="1"/>
+          </p:nvPr>
+        </p:nvSpPr>
+        <p:spPr/>
+        <p:txBody>
+          <a:bodyPr/>
+          <a:lstStyle/>
+          <a:p>
+            <a:pPr algn="l">
+              <a:defRPr sz="2400">
+                <a:solidFill>
+                  <a:srgbClr val="28283C"/>
+                </a:solidFill>
+                <a:latin typeface="Comic Sans MS"/>
+              </a:defRPr>
+            </a:pPr>
+            <a:r>
+              <a:rPr b="0" dirty="0" err="1">
+                <a:latin typeface="Trebuchet MS" panose="020B0703020202090204" pitchFamily="34" charset="0"/>
+              </a:rPr>
+              <a:t>Doppelsprung</a:t>
+            </a:r>
+            <a:endParaRPr b="0" dirty="0">
+              <a:latin typeface="Trebuchet MS" panose="020B0703020202090204" pitchFamily="34" charset="0"/>
+            </a:endParaRPr>
+          </a:p>
+          <a:p>
+            <a:pPr algn="l">
+              <a:defRPr sz="2400">
+                <a:solidFill>
+                  <a:srgbClr val="28283C"/>
+                </a:solidFill>
+                <a:latin typeface="Comic Sans MS"/>
+              </a:defRPr>
+            </a:pPr>
+            <a:r>
+              <a:rPr b="0" dirty="0">
+                <a:latin typeface="Trebuchet MS" panose="020B0703020202090204" pitchFamily="34" charset="0"/>
+              </a:rPr>
+              <a:t>Sterne </a:t>
+            </a:r>
+            <a:r>
+              <a:rPr b="0" dirty="0" err="1">
+                <a:latin typeface="Trebuchet MS" panose="020B0703020202090204" pitchFamily="34" charset="0"/>
+              </a:rPr>
+              <a:t>einsammeln</a:t>
+            </a:r>
+            <a:r>
+              <a:rPr b="0" dirty="0">
+                <a:latin typeface="Trebuchet MS" panose="020B0703020202090204" pitchFamily="34" charset="0"/>
+              </a:rPr>
+              <a:t> ⭐</a:t>
+            </a:r>
+          </a:p>
+          <a:p>
+            <a:pPr algn="l">
+              <a:defRPr sz="2400">
+                <a:solidFill>
+                  <a:srgbClr val="28283C"/>
+                </a:solidFill>
+                <a:latin typeface="Comic Sans MS"/>
+              </a:defRPr>
+            </a:pPr>
+            <a:r>
+              <a:rPr b="0" dirty="0" err="1">
+                <a:latin typeface="Trebuchet MS" panose="020B0703020202090204" pitchFamily="34" charset="0"/>
+              </a:rPr>
+              <a:t>Farbwechsel</a:t>
+            </a:r>
+            <a:endParaRPr b="0" dirty="0">
+              <a:latin typeface="Trebuchet MS" panose="020B0703020202090204" pitchFamily="34" charset="0"/>
+            </a:endParaRPr>
+          </a:p>
+          <a:p>
+            <a:pPr algn="l">
+              <a:defRPr sz="2400">
+                <a:solidFill>
+                  <a:srgbClr val="28283C"/>
+                </a:solidFill>
+                <a:latin typeface="Comic Sans MS"/>
+              </a:defRPr>
+            </a:pPr>
+            <a:r>
+              <a:rPr b="0" dirty="0">
+                <a:latin typeface="Trebuchet MS" panose="020B0703020202090204" pitchFamily="34" charset="0"/>
+              </a:rPr>
+              <a:t>Gegner </a:t>
+            </a:r>
+            <a:r>
+              <a:rPr b="0" dirty="0" err="1">
+                <a:latin typeface="Trebuchet MS" panose="020B0703020202090204" pitchFamily="34" charset="0"/>
+              </a:rPr>
+              <a:t>oder</a:t>
+            </a:r>
+            <a:r>
+              <a:rPr b="0" dirty="0">
+                <a:latin typeface="Trebuchet MS" panose="020B0703020202090204" pitchFamily="34" charset="0"/>
+              </a:rPr>
+              <a:t> </a:t>
+            </a:r>
+            <a:r>
+              <a:rPr b="0" dirty="0" err="1">
+                <a:latin typeface="Trebuchet MS" panose="020B0703020202090204" pitchFamily="34" charset="0"/>
+              </a:rPr>
+              <a:t>Hindernisse</a:t>
+            </a:r>
+            <a:endParaRPr b="0" dirty="0">
+              <a:latin typeface="Trebuchet MS" panose="020B0703020202090204" pitchFamily="34" charset="0"/>
+            </a:endParaRPr>
+          </a:p>
+          <a:p>
+            <a:pPr algn="l">
+              <a:defRPr sz="2400">
+                <a:solidFill>
+                  <a:srgbClr val="28283C"/>
+                </a:solidFill>
+                <a:latin typeface="Comic Sans MS"/>
+              </a:defRPr>
+            </a:pPr>
+            <a:r>
+              <a:rPr b="0" dirty="0" err="1">
+                <a:latin typeface="Trebuchet MS" panose="020B0703020202090204" pitchFamily="34" charset="0"/>
+              </a:rPr>
+              <a:t>Punkte</a:t>
+            </a:r>
+            <a:r>
+              <a:rPr b="0" dirty="0">
+                <a:latin typeface="Trebuchet MS" panose="020B0703020202090204" pitchFamily="34" charset="0"/>
+              </a:rPr>
+              <a:t> &amp; Level</a:t>
+            </a:r>
+            <a:endParaRPr lang="de-DE" b="0" dirty="0">
+              <a:latin typeface="Trebuchet MS" panose="020B0703020202090204" pitchFamily="34" charset="0"/>
+            </a:endParaRPr>
+          </a:p>
+          <a:p>
+            <a:pPr algn="l">
+              <a:defRPr sz="2400">
+                <a:solidFill>
+                  <a:srgbClr val="28283C"/>
+                </a:solidFill>
+                <a:latin typeface="Comic Sans MS"/>
+              </a:defRPr>
+            </a:pPr>
+            <a:r>
+              <a:rPr lang="de-DE" dirty="0">
+                <a:latin typeface="Trebuchet MS" panose="020B0703020202090204" pitchFamily="34" charset="0"/>
+              </a:rPr>
+              <a:t>Sounds</a:t>
+            </a:r>
+            <a:endParaRPr b="0" dirty="0">
+              <a:latin typeface="Trebuchet MS" panose="020B0703020202090204" pitchFamily="34" charset="0"/>
+            </a:endParaRPr>
+          </a:p>
+        </p:txBody>
+      </p:sp>
+    </p:spTree>
+  </p:cSld>
+  <p:clrMapOvr>
+    <a:masterClrMapping/>
+  </p:clrMapOvr>
+</p:sld>
+</file>
+
+<file path=ppt/slides/slide16.xml><?xml version="1.0" encoding="utf-8"?>
+<p:sld xmlns:a="http://schemas.openxmlformats.org/drawingml/2006/main" xmlns:r="http://schemas.openxmlformats.org/officeDocument/2006/relationships" xmlns:p="http://schemas.openxmlformats.org/presentationml/2006/main">
+  <p:cSld>
+    <p:bg>
+      <p:bgPr>
+        <a:solidFill>
+          <a:srgbClr val="E6F0FF"/>
+        </a:solidFill>
+        <a:effectLst/>
+      </p:bgPr>
+    </p:bg>
+    <p:spTree>
+      <p:nvGrpSpPr>
+        <p:cNvPr id="1" name="">
+          <a:extLst>
+            <a:ext uri="{FF2B5EF4-FFF2-40B4-BE49-F238E27FC236}">
+              <a16:creationId xmlns:a16="http://schemas.microsoft.com/office/drawing/2014/main" id="{4F4736B4-E383-6D38-59D2-1B75A5F4D7D8}"/>
+            </a:ext>
+          </a:extLst>
+        </p:cNvPr>
+        <p:cNvGrpSpPr/>
+        <p:nvPr/>
+      </p:nvGrpSpPr>
+      <p:grpSpPr>
+        <a:xfrm>
+          <a:off x="0" y="0"/>
+          <a:ext cx="0" cy="0"/>
+          <a:chOff x="0" y="0"/>
+          <a:chExt cx="0" cy="0"/>
+        </a:xfrm>
+      </p:grpSpPr>
+      <p:sp>
+        <p:nvSpPr>
+          <p:cNvPr id="2" name="Title 1">
+            <a:extLst>
+              <a:ext uri="{FF2B5EF4-FFF2-40B4-BE49-F238E27FC236}">
+                <a16:creationId xmlns:a16="http://schemas.microsoft.com/office/drawing/2014/main" id="{3023F726-22D2-CA36-14CB-FC8830320189}"/>
+              </a:ext>
+            </a:extLst>
+          </p:cNvPr>
+          <p:cNvSpPr>
+            <a:spLocks noGrp="1"/>
+          </p:cNvSpPr>
+          <p:nvPr>
+            <p:ph type="title"/>
+          </p:nvPr>
+        </p:nvSpPr>
+        <p:spPr/>
+        <p:txBody>
+          <a:bodyPr/>
+          <a:lstStyle/>
+          <a:p>
+            <a:pPr>
+              <a:defRPr sz="2400">
+                <a:solidFill>
+                  <a:srgbClr val="28283C"/>
+                </a:solidFill>
+                <a:latin typeface="Comic Sans MS"/>
+              </a:defRPr>
+            </a:pPr>
+            <a:r>
+              <a:rPr lang="de-DE" b="0" dirty="0">
+                <a:latin typeface="Trebuchet MS" panose="020B0703020202090204" pitchFamily="34" charset="0"/>
+              </a:rPr>
+              <a:t>Was kann KI richtig gut</a:t>
+            </a:r>
+            <a:r>
+              <a:rPr b="0" dirty="0">
+                <a:latin typeface="Trebuchet MS" panose="020B0703020202090204" pitchFamily="34" charset="0"/>
+              </a:rPr>
+              <a:t>?</a:t>
+            </a:r>
+            <a:r>
+              <a:rPr lang="de-DE" dirty="0">
+                <a:latin typeface="Trebuchet MS" panose="020B0703020202090204" pitchFamily="34" charset="0"/>
+              </a:rPr>
+              <a:t> 🤖</a:t>
+            </a:r>
+            <a:endParaRPr b="0" dirty="0">
+              <a:latin typeface="Trebuchet MS" panose="020B0703020202090204" pitchFamily="34" charset="0"/>
+            </a:endParaRPr>
+          </a:p>
+        </p:txBody>
+      </p:sp>
+      <p:sp>
+        <p:nvSpPr>
+          <p:cNvPr id="6" name="Gefaltete Ecke 5">
+            <a:extLst>
+              <a:ext uri="{FF2B5EF4-FFF2-40B4-BE49-F238E27FC236}">
+                <a16:creationId xmlns:a16="http://schemas.microsoft.com/office/drawing/2014/main" id="{DF71C21D-D289-B85D-2078-56123162D0A5}"/>
+              </a:ext>
+            </a:extLst>
+          </p:cNvPr>
+          <p:cNvSpPr/>
+          <p:nvPr/>
+        </p:nvSpPr>
+        <p:spPr>
+          <a:xfrm>
+            <a:off x="1145628" y="1817031"/>
+            <a:ext cx="2963917" cy="1692166"/>
+          </a:xfrm>
+          <a:prstGeom prst="foldedCorner">
+            <a:avLst/>
+          </a:prstGeom>
+        </p:spPr>
+        <p:style>
+          <a:lnRef idx="1">
+            <a:schemeClr val="accent1"/>
+          </a:lnRef>
+          <a:fillRef idx="3">
+            <a:schemeClr val="accent1"/>
+          </a:fillRef>
+          <a:effectRef idx="2">
+            <a:schemeClr val="accent1"/>
+          </a:effectRef>
+          <a:fontRef idx="minor">
+            <a:schemeClr val="lt1"/>
+          </a:fontRef>
+        </p:style>
+        <p:txBody>
+          <a:bodyPr rtlCol="0" anchor="ctr"/>
+          <a:lstStyle/>
+          <a:p>
+            <a:pPr algn="ctr"/>
+            <a:endParaRPr lang="de-DE"/>
+          </a:p>
+        </p:txBody>
+      </p:sp>
+      <p:sp>
+        <p:nvSpPr>
+          <p:cNvPr id="7" name="Gefaltete Ecke 6">
+            <a:extLst>
+              <a:ext uri="{FF2B5EF4-FFF2-40B4-BE49-F238E27FC236}">
+                <a16:creationId xmlns:a16="http://schemas.microsoft.com/office/drawing/2014/main" id="{186653BD-14BC-01A3-9608-0949F303B73E}"/>
+              </a:ext>
+            </a:extLst>
+          </p:cNvPr>
+          <p:cNvSpPr/>
+          <p:nvPr/>
+        </p:nvSpPr>
+        <p:spPr>
+          <a:xfrm>
+            <a:off x="4577256" y="1817031"/>
+            <a:ext cx="2963917" cy="1692166"/>
+          </a:xfrm>
+          <a:prstGeom prst="foldedCorner">
+            <a:avLst/>
+          </a:prstGeom>
+        </p:spPr>
+        <p:style>
+          <a:lnRef idx="1">
+            <a:schemeClr val="accent6"/>
+          </a:lnRef>
+          <a:fillRef idx="2">
+            <a:schemeClr val="accent6"/>
+          </a:fillRef>
+          <a:effectRef idx="1">
+            <a:schemeClr val="accent6"/>
+          </a:effectRef>
+          <a:fontRef idx="minor">
+            <a:schemeClr val="dk1"/>
+          </a:fontRef>
+        </p:style>
+        <p:txBody>
+          <a:bodyPr rtlCol="0" anchor="ctr"/>
+          <a:lstStyle/>
+          <a:p>
+            <a:pPr algn="ctr"/>
+            <a:endParaRPr lang="de-DE"/>
+          </a:p>
+        </p:txBody>
+      </p:sp>
+      <p:sp>
+        <p:nvSpPr>
+          <p:cNvPr id="8" name="Gefaltete Ecke 7">
+            <a:extLst>
+              <a:ext uri="{FF2B5EF4-FFF2-40B4-BE49-F238E27FC236}">
+                <a16:creationId xmlns:a16="http://schemas.microsoft.com/office/drawing/2014/main" id="{EAE9168B-467E-21F2-F254-C44AEFE2156D}"/>
+              </a:ext>
+            </a:extLst>
+          </p:cNvPr>
+          <p:cNvSpPr/>
+          <p:nvPr/>
+        </p:nvSpPr>
+        <p:spPr>
+          <a:xfrm>
+            <a:off x="1145628" y="3966397"/>
+            <a:ext cx="2963917" cy="1692166"/>
+          </a:xfrm>
+          <a:prstGeom prst="foldedCorner">
+            <a:avLst/>
+          </a:prstGeom>
+        </p:spPr>
+        <p:style>
+          <a:lnRef idx="1">
+            <a:schemeClr val="accent3"/>
+          </a:lnRef>
+          <a:fillRef idx="3">
+            <a:schemeClr val="accent3"/>
+          </a:fillRef>
+          <a:effectRef idx="2">
+            <a:schemeClr val="accent3"/>
+          </a:effectRef>
+          <a:fontRef idx="minor">
+            <a:schemeClr val="lt1"/>
+          </a:fontRef>
+        </p:style>
+        <p:txBody>
+          <a:bodyPr rtlCol="0" anchor="ctr"/>
+          <a:lstStyle/>
+          <a:p>
+            <a:pPr algn="ctr"/>
+            <a:endParaRPr lang="de-DE"/>
+          </a:p>
+        </p:txBody>
+      </p:sp>
+      <p:sp>
+        <p:nvSpPr>
+          <p:cNvPr id="9" name="Gefaltete Ecke 8">
+            <a:extLst>
+              <a:ext uri="{FF2B5EF4-FFF2-40B4-BE49-F238E27FC236}">
+                <a16:creationId xmlns:a16="http://schemas.microsoft.com/office/drawing/2014/main" id="{1F5FDFF0-D3EA-97EE-5707-9E0941F11E4B}"/>
+              </a:ext>
+            </a:extLst>
+          </p:cNvPr>
+          <p:cNvSpPr/>
+          <p:nvPr/>
+        </p:nvSpPr>
+        <p:spPr>
+          <a:xfrm>
+            <a:off x="4577256" y="3966397"/>
+            <a:ext cx="2963917" cy="1692166"/>
+          </a:xfrm>
+          <a:prstGeom prst="foldedCorner">
+            <a:avLst/>
+          </a:prstGeom>
+        </p:spPr>
+        <p:style>
+          <a:lnRef idx="1">
+            <a:schemeClr val="accent4"/>
+          </a:lnRef>
+          <a:fillRef idx="3">
+            <a:schemeClr val="accent4"/>
+          </a:fillRef>
+          <a:effectRef idx="2">
+            <a:schemeClr val="accent4"/>
+          </a:effectRef>
+          <a:fontRef idx="minor">
+            <a:schemeClr val="lt1"/>
+          </a:fontRef>
+        </p:style>
+        <p:txBody>
+          <a:bodyPr rtlCol="0" anchor="ctr"/>
+          <a:lstStyle/>
+          <a:p>
+            <a:pPr algn="ctr"/>
+            <a:endParaRPr lang="de-DE"/>
+          </a:p>
+        </p:txBody>
+      </p:sp>
+    </p:spTree>
+    <p:extLst>
+      <p:ext uri="{BB962C8B-B14F-4D97-AF65-F5344CB8AC3E}">
+        <p14:creationId xmlns:p14="http://schemas.microsoft.com/office/powerpoint/2010/main" val="463026155"/>
+      </p:ext>
+    </p:extLst>
+  </p:cSld>
+  <p:clrMapOvr>
+    <a:masterClrMapping/>
+  </p:clrMapOvr>
+</p:sld>
+</file>
+
+<file path=ppt/slides/slide17.xml><?xml version="1.0" encoding="utf-8"?>
+<p:sld xmlns:a="http://schemas.openxmlformats.org/drawingml/2006/main" xmlns:r="http://schemas.openxmlformats.org/officeDocument/2006/relationships" xmlns:p="http://schemas.openxmlformats.org/presentationml/2006/main">
+  <p:cSld>
+    <p:bg>
+      <p:bgPr>
+        <a:solidFill>
+          <a:srgbClr val="E6F0FF"/>
+        </a:solidFill>
+        <a:effectLst/>
+      </p:bgPr>
+    </p:bg>
+    <p:spTree>
+      <p:nvGrpSpPr>
+        <p:cNvPr id="1" name="">
+          <a:extLst>
+            <a:ext uri="{FF2B5EF4-FFF2-40B4-BE49-F238E27FC236}">
+              <a16:creationId xmlns:a16="http://schemas.microsoft.com/office/drawing/2014/main" id="{C5566654-9E86-9D53-FE92-F076C8993C34}"/>
+            </a:ext>
+          </a:extLst>
+        </p:cNvPr>
+        <p:cNvGrpSpPr/>
+        <p:nvPr/>
+      </p:nvGrpSpPr>
+      <p:grpSpPr>
+        <a:xfrm>
+          <a:off x="0" y="0"/>
+          <a:ext cx="0" cy="0"/>
+          <a:chOff x="0" y="0"/>
+          <a:chExt cx="0" cy="0"/>
+        </a:xfrm>
+      </p:grpSpPr>
+      <p:sp>
+        <p:nvSpPr>
+          <p:cNvPr id="2" name="Title 1">
+            <a:extLst>
+              <a:ext uri="{FF2B5EF4-FFF2-40B4-BE49-F238E27FC236}">
+                <a16:creationId xmlns:a16="http://schemas.microsoft.com/office/drawing/2014/main" id="{561C656F-F549-CA9A-A356-6153459F13C6}"/>
+              </a:ext>
+            </a:extLst>
+          </p:cNvPr>
+          <p:cNvSpPr>
+            <a:spLocks noGrp="1"/>
+          </p:cNvSpPr>
+          <p:nvPr>
+            <p:ph type="title"/>
+          </p:nvPr>
+        </p:nvSpPr>
+        <p:spPr/>
+        <p:txBody>
+          <a:bodyPr/>
+          <a:lstStyle/>
+          <a:p>
+            <a:pPr>
+              <a:defRPr sz="2400">
+                <a:solidFill>
+                  <a:srgbClr val="28283C"/>
+                </a:solidFill>
+                <a:latin typeface="Comic Sans MS"/>
+              </a:defRPr>
+            </a:pPr>
+            <a:r>
+              <a:rPr lang="de-DE" b="0" dirty="0">
+                <a:latin typeface="Trebuchet MS" panose="020B0703020202090204" pitchFamily="34" charset="0"/>
+              </a:rPr>
+              <a:t>Was lief nicht so gut</a:t>
+            </a:r>
+            <a:r>
+              <a:rPr b="0" dirty="0">
+                <a:latin typeface="Trebuchet MS" panose="020B0703020202090204" pitchFamily="34" charset="0"/>
+              </a:rPr>
+              <a:t>?</a:t>
+            </a:r>
+            <a:r>
+              <a:rPr lang="de-DE" dirty="0">
+                <a:latin typeface="Trebuchet MS" panose="020B0703020202090204" pitchFamily="34" charset="0"/>
+              </a:rPr>
+              <a:t> 🤖</a:t>
+            </a:r>
+            <a:endParaRPr b="0" dirty="0">
+              <a:latin typeface="Trebuchet MS" panose="020B0703020202090204" pitchFamily="34" charset="0"/>
+            </a:endParaRPr>
+          </a:p>
+        </p:txBody>
+      </p:sp>
+      <p:sp>
+        <p:nvSpPr>
+          <p:cNvPr id="6" name="Gefaltete Ecke 5">
+            <a:extLst>
+              <a:ext uri="{FF2B5EF4-FFF2-40B4-BE49-F238E27FC236}">
+                <a16:creationId xmlns:a16="http://schemas.microsoft.com/office/drawing/2014/main" id="{883029F1-A351-88CA-9BEC-518B0837121C}"/>
+              </a:ext>
+            </a:extLst>
+          </p:cNvPr>
+          <p:cNvSpPr/>
+          <p:nvPr/>
+        </p:nvSpPr>
+        <p:spPr>
+          <a:xfrm>
+            <a:off x="1145628" y="1817031"/>
+            <a:ext cx="2963917" cy="1692166"/>
+          </a:xfrm>
+          <a:prstGeom prst="foldedCorner">
+            <a:avLst/>
+          </a:prstGeom>
+        </p:spPr>
+        <p:style>
+          <a:lnRef idx="1">
+            <a:schemeClr val="accent1"/>
+          </a:lnRef>
+          <a:fillRef idx="3">
+            <a:schemeClr val="accent1"/>
+          </a:fillRef>
+          <a:effectRef idx="2">
+            <a:schemeClr val="accent1"/>
+          </a:effectRef>
+          <a:fontRef idx="minor">
+            <a:schemeClr val="lt1"/>
+          </a:fontRef>
+        </p:style>
+        <p:txBody>
+          <a:bodyPr rtlCol="0" anchor="ctr"/>
+          <a:lstStyle/>
+          <a:p>
+            <a:pPr algn="ctr"/>
+            <a:endParaRPr lang="de-DE"/>
+          </a:p>
+        </p:txBody>
+      </p:sp>
+      <p:sp>
+        <p:nvSpPr>
+          <p:cNvPr id="7" name="Gefaltete Ecke 6">
+            <a:extLst>
+              <a:ext uri="{FF2B5EF4-FFF2-40B4-BE49-F238E27FC236}">
+                <a16:creationId xmlns:a16="http://schemas.microsoft.com/office/drawing/2014/main" id="{39C54B25-F88E-5282-35DB-097AD0355916}"/>
+              </a:ext>
+            </a:extLst>
+          </p:cNvPr>
+          <p:cNvSpPr/>
+          <p:nvPr/>
+        </p:nvSpPr>
+        <p:spPr>
+          <a:xfrm>
+            <a:off x="4577256" y="1817031"/>
+            <a:ext cx="2963917" cy="1692166"/>
+          </a:xfrm>
+          <a:prstGeom prst="foldedCorner">
+            <a:avLst/>
+          </a:prstGeom>
+        </p:spPr>
+        <p:style>
+          <a:lnRef idx="1">
+            <a:schemeClr val="accent6"/>
+          </a:lnRef>
+          <a:fillRef idx="2">
+            <a:schemeClr val="accent6"/>
+          </a:fillRef>
+          <a:effectRef idx="1">
+            <a:schemeClr val="accent6"/>
+          </a:effectRef>
+          <a:fontRef idx="minor">
+            <a:schemeClr val="dk1"/>
+          </a:fontRef>
+        </p:style>
+        <p:txBody>
+          <a:bodyPr rtlCol="0" anchor="ctr"/>
+          <a:lstStyle/>
+          <a:p>
+            <a:pPr algn="ctr"/>
+            <a:endParaRPr lang="de-DE"/>
+          </a:p>
+        </p:txBody>
+      </p:sp>
+      <p:sp>
+        <p:nvSpPr>
+          <p:cNvPr id="8" name="Gefaltete Ecke 7">
+            <a:extLst>
+              <a:ext uri="{FF2B5EF4-FFF2-40B4-BE49-F238E27FC236}">
+                <a16:creationId xmlns:a16="http://schemas.microsoft.com/office/drawing/2014/main" id="{D9F2D8B4-6B51-6196-78BD-EA88C5BF3317}"/>
+              </a:ext>
+            </a:extLst>
+          </p:cNvPr>
+          <p:cNvSpPr/>
+          <p:nvPr/>
+        </p:nvSpPr>
+        <p:spPr>
+          <a:xfrm>
+            <a:off x="1145628" y="3966397"/>
+            <a:ext cx="2963917" cy="1692166"/>
+          </a:xfrm>
+          <a:prstGeom prst="foldedCorner">
+            <a:avLst/>
+          </a:prstGeom>
+        </p:spPr>
+        <p:style>
+          <a:lnRef idx="1">
+            <a:schemeClr val="accent3"/>
+          </a:lnRef>
+          <a:fillRef idx="3">
+            <a:schemeClr val="accent3"/>
+          </a:fillRef>
+          <a:effectRef idx="2">
+            <a:schemeClr val="accent3"/>
+          </a:effectRef>
+          <a:fontRef idx="minor">
+            <a:schemeClr val="lt1"/>
+          </a:fontRef>
+        </p:style>
+        <p:txBody>
+          <a:bodyPr rtlCol="0" anchor="ctr"/>
+          <a:lstStyle/>
+          <a:p>
+            <a:pPr algn="ctr"/>
+            <a:endParaRPr lang="de-DE"/>
+          </a:p>
+        </p:txBody>
+      </p:sp>
+      <p:sp>
+        <p:nvSpPr>
+          <p:cNvPr id="9" name="Gefaltete Ecke 8">
+            <a:extLst>
+              <a:ext uri="{FF2B5EF4-FFF2-40B4-BE49-F238E27FC236}">
+                <a16:creationId xmlns:a16="http://schemas.microsoft.com/office/drawing/2014/main" id="{23978E43-90BB-39EA-F76D-A6617B5EB4E0}"/>
+              </a:ext>
+            </a:extLst>
+          </p:cNvPr>
+          <p:cNvSpPr/>
+          <p:nvPr/>
+        </p:nvSpPr>
+        <p:spPr>
+          <a:xfrm>
+            <a:off x="4577256" y="3966397"/>
+            <a:ext cx="2963917" cy="1692166"/>
+          </a:xfrm>
+          <a:prstGeom prst="foldedCorner">
+            <a:avLst/>
+          </a:prstGeom>
+        </p:spPr>
+        <p:style>
+          <a:lnRef idx="1">
+            <a:schemeClr val="accent4"/>
+          </a:lnRef>
+          <a:fillRef idx="3">
+            <a:schemeClr val="accent4"/>
+          </a:fillRef>
+          <a:effectRef idx="2">
+            <a:schemeClr val="accent4"/>
+          </a:effectRef>
+          <a:fontRef idx="minor">
+            <a:schemeClr val="lt1"/>
+          </a:fontRef>
+        </p:style>
+        <p:txBody>
+          <a:bodyPr rtlCol="0" anchor="ctr"/>
+          <a:lstStyle/>
+          <a:p>
+            <a:pPr algn="ctr"/>
+            <a:endParaRPr lang="de-DE"/>
+          </a:p>
+        </p:txBody>
+      </p:sp>
+    </p:spTree>
+    <p:extLst>
+      <p:ext uri="{BB962C8B-B14F-4D97-AF65-F5344CB8AC3E}">
+        <p14:creationId xmlns:p14="http://schemas.microsoft.com/office/powerpoint/2010/main" val="3037679161"/>
+      </p:ext>
+    </p:extLst>
+  </p:cSld>
+  <p:clrMapOvr>
+    <a:masterClrMapping/>
+  </p:clrMapOvr>
+</p:sld>
+</file>
+
+<file path=ppt/slides/slide18.xml><?xml version="1.0" encoding="utf-8"?>
 <p:sld xmlns:a="http://schemas.openxmlformats.org/drawingml/2006/main" xmlns:r="http://schemas.openxmlformats.org/officeDocument/2006/relationships" xmlns:p="http://schemas.openxmlformats.org/presentationml/2006/main">
   <p:cSld>
     <p:bg>
@@ -4114,7 +5193,7 @@
               <a:rPr lang="de-DE" b="0" dirty="0">
                 <a:latin typeface="Trebuchet MS" panose="020B0703020202090204" pitchFamily="34" charset="0"/>
               </a:rPr>
-              <a:t>KI weiß nur, was sie gelernt hat</a:t>
+              <a:t>KI weiß nur, was sie gelernt hat („Training“)</a:t>
             </a:r>
           </a:p>
           <a:p>
@@ -4127,17 +5206,14 @@
               </a:defRPr>
             </a:pPr>
             <a:r>
-              <a:rPr lang="de-DE" b="0" dirty="0">
-                <a:latin typeface="Trebuchet MS" panose="020B0703020202090204" pitchFamily="34" charset="0"/>
-              </a:rPr>
-              <a:t>KI kann sich irren oder Dinge erfinden</a:t>
-            </a:r>
-            <a:endParaRPr b="0" dirty="0">
-              <a:latin typeface="Trebuchet MS" panose="020B0703020202090204" pitchFamily="34" charset="0"/>
-            </a:endParaRPr>
-          </a:p>
-          <a:p>
-            <a:pPr algn="l">
+              <a:rPr lang="de-DE" dirty="0">
+                <a:latin typeface="Trebuchet MS" panose="020B0703020202090204" pitchFamily="34" charset="0"/>
+              </a:rPr>
+              <a:t>KI erstellt ein Programm immer etwas anders</a:t>
+            </a:r>
+          </a:p>
+          <a:p>
+            <a:pPr>
               <a:defRPr sz="2400">
                 <a:solidFill>
                   <a:srgbClr val="28283C"/>
@@ -4146,10 +5222,10 @@
               </a:defRPr>
             </a:pPr>
             <a:r>
-              <a:rPr lang="de-DE" b="0" dirty="0">
-                <a:latin typeface="Trebuchet MS" panose="020B0703020202090204" pitchFamily="34" charset="0"/>
-              </a:rPr>
-              <a:t>KI kann sich verrennen</a:t>
+              <a:rPr lang="de-DE" dirty="0">
+                <a:latin typeface="Trebuchet MS" panose="020B0703020202090204" pitchFamily="34" charset="0"/>
+              </a:rPr>
+              <a:t>KI kann sich irren und Fehler ins Programm einbauen</a:t>
             </a:r>
           </a:p>
           <a:p>
@@ -4186,7 +5262,7 @@
 </p:sld>
 </file>
 
-<file path=ppt/slides/slide15.xml><?xml version="1.0" encoding="utf-8"?>
+<file path=ppt/slides/slide19.xml><?xml version="1.0" encoding="utf-8"?>
 <p:sld xmlns:a="http://schemas.openxmlformats.org/drawingml/2006/main" xmlns:r="http://schemas.openxmlformats.org/officeDocument/2006/relationships" xmlns:p="http://schemas.openxmlformats.org/presentationml/2006/main">
   <p:cSld>
     <p:bg>
@@ -4202,7 +5278,7 @@
         <p:cNvPr id="1" name="">
           <a:extLst>
             <a:ext uri="{FF2B5EF4-FFF2-40B4-BE49-F238E27FC236}">
-              <a16:creationId xmlns:a16="http://schemas.microsoft.com/office/drawing/2014/main" id="{4F4736B4-E383-6D38-59D2-1B75A5F4D7D8}"/>
+              <a16:creationId xmlns:a16="http://schemas.microsoft.com/office/drawing/2014/main" id="{5FC4654B-084D-E7AB-CC98-66E01E03857C}"/>
             </a:ext>
           </a:extLst>
         </p:cNvPr>
@@ -4222,7 +5298,7 @@
           <p:cNvPr id="2" name="Title 1">
             <a:extLst>
               <a:ext uri="{FF2B5EF4-FFF2-40B4-BE49-F238E27FC236}">
-                <a16:creationId xmlns:a16="http://schemas.microsoft.com/office/drawing/2014/main" id="{3023F726-22D2-CA36-14CB-FC8830320189}"/>
+                <a16:creationId xmlns:a16="http://schemas.microsoft.com/office/drawing/2014/main" id="{6029BF35-83B1-E188-36BA-87BE1B5176C1}"/>
               </a:ext>
             </a:extLst>
           </p:cNvPr>
@@ -4250,25 +5326,13 @@
               <a:rPr lang="de-DE" b="0" dirty="0">
                 <a:latin typeface="Trebuchet MS" panose="020B0703020202090204" pitchFamily="34" charset="0"/>
               </a:rPr>
-              <a:t>Was könnten wir mit KI noch </a:t>
+              <a:t>Ergebnis ist immer anders </a:t>
             </a:r>
             <a:r>
               <a:rPr lang="de-DE" dirty="0">
                 <a:latin typeface="Trebuchet MS" panose="020B0703020202090204" pitchFamily="34" charset="0"/>
               </a:rPr>
-              <a:t>machen</a:t>
-            </a:r>
-            <a:r>
-              <a:rPr b="0" dirty="0">
-                <a:latin typeface="Trebuchet MS" panose="020B0703020202090204" pitchFamily="34" charset="0"/>
-              </a:rPr>
-              <a:t>?</a:t>
-            </a:r>
-            <a:r>
-              <a:rPr lang="de-DE" dirty="0">
-                <a:latin typeface="Trebuchet MS" panose="020B0703020202090204" pitchFamily="34" charset="0"/>
-              </a:rPr>
-              <a:t> 🤖</a:t>
+              <a:t>🤖</a:t>
             </a:r>
             <a:endParaRPr b="0" dirty="0">
               <a:latin typeface="Trebuchet MS" panose="020B0703020202090204" pitchFamily="34" charset="0"/>
@@ -4276,186 +5340,72 @@
           </a:p>
         </p:txBody>
       </p:sp>
-      <p:sp>
-        <p:nvSpPr>
-          <p:cNvPr id="6" name="Gefaltete Ecke 5">
+      <p:pic>
+        <p:nvPicPr>
+          <p:cNvPr id="4" name="Grafik 3">
             <a:extLst>
               <a:ext uri="{FF2B5EF4-FFF2-40B4-BE49-F238E27FC236}">
-                <a16:creationId xmlns:a16="http://schemas.microsoft.com/office/drawing/2014/main" id="{DF71C21D-D289-B85D-2078-56123162D0A5}"/>
+                <a16:creationId xmlns:a16="http://schemas.microsoft.com/office/drawing/2014/main" id="{EF367CE8-A371-94D9-39CD-14AFB2CB6CD1}"/>
               </a:ext>
             </a:extLst>
           </p:cNvPr>
-          <p:cNvSpPr/>
+          <p:cNvPicPr>
+            <a:picLocks noChangeAspect="1"/>
+          </p:cNvPicPr>
           <p:nvPr/>
-        </p:nvSpPr>
+        </p:nvPicPr>
+        <p:blipFill>
+          <a:blip r:embed="rId2"/>
+          <a:srcRect r="15994"/>
+          <a:stretch>
+            <a:fillRect/>
+          </a:stretch>
+        </p:blipFill>
         <p:spPr>
           <a:xfrm>
-            <a:off x="1145628" y="1817031"/>
-            <a:ext cx="2963917" cy="1692166"/>
+            <a:off x="354330" y="1559295"/>
+            <a:ext cx="5132070" cy="4541520"/>
           </a:xfrm>
-          <a:prstGeom prst="foldedCorner">
+          <a:prstGeom prst="rect">
             <a:avLst/>
           </a:prstGeom>
         </p:spPr>
-        <p:style>
-          <a:lnRef idx="1">
-            <a:schemeClr val="accent1"/>
-          </a:lnRef>
-          <a:fillRef idx="3">
-            <a:schemeClr val="accent1"/>
-          </a:fillRef>
-          <a:effectRef idx="2">
-            <a:schemeClr val="accent1"/>
-          </a:effectRef>
-          <a:fontRef idx="minor">
-            <a:schemeClr val="lt1"/>
-          </a:fontRef>
-        </p:style>
-        <p:txBody>
-          <a:bodyPr rtlCol="0" anchor="ctr"/>
-          <a:lstStyle/>
-          <a:p>
-            <a:pPr algn="ctr"/>
-            <a:endParaRPr lang="de-DE"/>
-          </a:p>
-        </p:txBody>
-      </p:sp>
-      <p:sp>
-        <p:nvSpPr>
-          <p:cNvPr id="7" name="Gefaltete Ecke 6">
+      </p:pic>
+      <p:pic>
+        <p:nvPicPr>
+          <p:cNvPr id="7" name="Grafik 6">
             <a:extLst>
               <a:ext uri="{FF2B5EF4-FFF2-40B4-BE49-F238E27FC236}">
-                <a16:creationId xmlns:a16="http://schemas.microsoft.com/office/drawing/2014/main" id="{186653BD-14BC-01A3-9608-0949F303B73E}"/>
+                <a16:creationId xmlns:a16="http://schemas.microsoft.com/office/drawing/2014/main" id="{E66A1BEE-9795-0038-5C9F-8B7E6D4595CB}"/>
               </a:ext>
             </a:extLst>
           </p:cNvPr>
-          <p:cNvSpPr/>
+          <p:cNvPicPr>
+            <a:picLocks noChangeAspect="1"/>
+          </p:cNvPicPr>
           <p:nvPr/>
-        </p:nvSpPr>
+        </p:nvPicPr>
+        <p:blipFill>
+          <a:blip r:embed="rId3"/>
+          <a:srcRect t="9008" r="32049"/>
+          <a:stretch>
+            <a:fillRect/>
+          </a:stretch>
+        </p:blipFill>
         <p:spPr>
           <a:xfrm>
-            <a:off x="4577256" y="1817031"/>
-            <a:ext cx="2963917" cy="1692166"/>
+            <a:off x="5608320" y="1559295"/>
+            <a:ext cx="3158490" cy="4541520"/>
           </a:xfrm>
-          <a:prstGeom prst="foldedCorner">
+          <a:prstGeom prst="rect">
             <a:avLst/>
           </a:prstGeom>
         </p:spPr>
-        <p:style>
-          <a:lnRef idx="1">
-            <a:schemeClr val="accent6"/>
-          </a:lnRef>
-          <a:fillRef idx="2">
-            <a:schemeClr val="accent6"/>
-          </a:fillRef>
-          <a:effectRef idx="1">
-            <a:schemeClr val="accent6"/>
-          </a:effectRef>
-          <a:fontRef idx="minor">
-            <a:schemeClr val="dk1"/>
-          </a:fontRef>
-        </p:style>
-        <p:txBody>
-          <a:bodyPr rtlCol="0" anchor="ctr"/>
-          <a:lstStyle/>
-          <a:p>
-            <a:pPr algn="ctr"/>
-            <a:endParaRPr lang="de-DE"/>
-          </a:p>
-        </p:txBody>
-      </p:sp>
-      <p:sp>
-        <p:nvSpPr>
-          <p:cNvPr id="8" name="Gefaltete Ecke 7">
-            <a:extLst>
-              <a:ext uri="{FF2B5EF4-FFF2-40B4-BE49-F238E27FC236}">
-                <a16:creationId xmlns:a16="http://schemas.microsoft.com/office/drawing/2014/main" id="{EAE9168B-467E-21F2-F254-C44AEFE2156D}"/>
-              </a:ext>
-            </a:extLst>
-          </p:cNvPr>
-          <p:cNvSpPr/>
-          <p:nvPr/>
-        </p:nvSpPr>
-        <p:spPr>
-          <a:xfrm>
-            <a:off x="1145628" y="3966397"/>
-            <a:ext cx="2963917" cy="1692166"/>
-          </a:xfrm>
-          <a:prstGeom prst="foldedCorner">
-            <a:avLst/>
-          </a:prstGeom>
-        </p:spPr>
-        <p:style>
-          <a:lnRef idx="1">
-            <a:schemeClr val="accent3"/>
-          </a:lnRef>
-          <a:fillRef idx="3">
-            <a:schemeClr val="accent3"/>
-          </a:fillRef>
-          <a:effectRef idx="2">
-            <a:schemeClr val="accent3"/>
-          </a:effectRef>
-          <a:fontRef idx="minor">
-            <a:schemeClr val="lt1"/>
-          </a:fontRef>
-        </p:style>
-        <p:txBody>
-          <a:bodyPr rtlCol="0" anchor="ctr"/>
-          <a:lstStyle/>
-          <a:p>
-            <a:pPr algn="ctr"/>
-            <a:endParaRPr lang="de-DE"/>
-          </a:p>
-        </p:txBody>
-      </p:sp>
-      <p:sp>
-        <p:nvSpPr>
-          <p:cNvPr id="9" name="Gefaltete Ecke 8">
-            <a:extLst>
-              <a:ext uri="{FF2B5EF4-FFF2-40B4-BE49-F238E27FC236}">
-                <a16:creationId xmlns:a16="http://schemas.microsoft.com/office/drawing/2014/main" id="{1F5FDFF0-D3EA-97EE-5707-9E0941F11E4B}"/>
-              </a:ext>
-            </a:extLst>
-          </p:cNvPr>
-          <p:cNvSpPr/>
-          <p:nvPr/>
-        </p:nvSpPr>
-        <p:spPr>
-          <a:xfrm>
-            <a:off x="4577256" y="3966397"/>
-            <a:ext cx="2963917" cy="1692166"/>
-          </a:xfrm>
-          <a:prstGeom prst="foldedCorner">
-            <a:avLst/>
-          </a:prstGeom>
-        </p:spPr>
-        <p:style>
-          <a:lnRef idx="1">
-            <a:schemeClr val="accent4"/>
-          </a:lnRef>
-          <a:fillRef idx="3">
-            <a:schemeClr val="accent4"/>
-          </a:fillRef>
-          <a:effectRef idx="2">
-            <a:schemeClr val="accent4"/>
-          </a:effectRef>
-          <a:fontRef idx="minor">
-            <a:schemeClr val="lt1"/>
-          </a:fontRef>
-        </p:style>
-        <p:txBody>
-          <a:bodyPr rtlCol="0" anchor="ctr"/>
-          <a:lstStyle/>
-          <a:p>
-            <a:pPr algn="ctr"/>
-            <a:endParaRPr lang="de-DE"/>
-          </a:p>
-        </p:txBody>
-      </p:sp>
+      </p:pic>
     </p:spTree>
     <p:extLst>
       <p:ext uri="{BB962C8B-B14F-4D97-AF65-F5344CB8AC3E}">
-        <p14:creationId xmlns:p14="http://schemas.microsoft.com/office/powerpoint/2010/main" val="463026155"/>
+        <p14:creationId xmlns:p14="http://schemas.microsoft.com/office/powerpoint/2010/main" val="2692892113"/>
       </p:ext>
     </p:extLst>
   </p:cSld>
@@ -4465,7 +5415,7 @@
 </p:sld>
 </file>
 
-<file path=ppt/slides/slide16.xml><?xml version="1.0" encoding="utf-8"?>
+<file path=ppt/slides/slide2.xml><?xml version="1.0" encoding="utf-8"?>
 <p:sld xmlns:a="http://schemas.openxmlformats.org/drawingml/2006/main" xmlns:r="http://schemas.openxmlformats.org/officeDocument/2006/relationships" xmlns:p="http://schemas.openxmlformats.org/presentationml/2006/main">
   <p:cSld>
     <p:bg>
@@ -4517,80 +5467,57 @@
               <a:rPr b="0" dirty="0" err="1">
                 <a:latin typeface="Trebuchet MS" panose="020B0703020202090204" pitchFamily="34" charset="0"/>
               </a:rPr>
-              <a:t>Euer</a:t>
+              <a:t>Willkommen</a:t>
             </a:r>
             <a:r>
               <a:rPr b="0" dirty="0">
                 <a:latin typeface="Trebuchet MS" panose="020B0703020202090204" pitchFamily="34" charset="0"/>
               </a:rPr>
-              <a:t> Projekt 🚀</a:t>
-            </a:r>
-          </a:p>
-        </p:txBody>
-      </p:sp>
-      <p:sp>
-        <p:nvSpPr>
-          <p:cNvPr id="3" name="Content Placeholder 2"/>
-          <p:cNvSpPr>
-            <a:spLocks noGrp="1"/>
-          </p:cNvSpPr>
-          <p:nvPr>
-            <p:ph idx="1"/>
-          </p:nvPr>
-        </p:nvSpPr>
-        <p:spPr/>
-        <p:txBody>
-          <a:bodyPr/>
-          <a:lstStyle/>
-          <a:p>
-            <a:pPr algn="l">
-              <a:defRPr sz="2400">
-                <a:solidFill>
-                  <a:srgbClr val="28283C"/>
-                </a:solidFill>
-                <a:latin typeface="Comic Sans MS"/>
-              </a:defRPr>
-            </a:pPr>
-            <a:r>
-              <a:rPr b="0" dirty="0">
-                <a:latin typeface="Trebuchet MS" panose="020B0703020202090204" pitchFamily="34" charset="0"/>
-              </a:rPr>
-              <a:t>1️⃣ </a:t>
-            </a:r>
-            <a:r>
-              <a:rPr b="0" dirty="0" err="1">
-                <a:latin typeface="Trebuchet MS" panose="020B0703020202090204" pitchFamily="34" charset="0"/>
-              </a:rPr>
-              <a:t>Wählt</a:t>
-            </a:r>
-            <a:r>
-              <a:rPr b="0" dirty="0">
-                <a:latin typeface="Trebuchet MS" panose="020B0703020202090204" pitchFamily="34" charset="0"/>
-              </a:rPr>
-              <a:t>: Ball-Spiel </a:t>
-            </a:r>
-            <a:r>
-              <a:rPr b="0" dirty="0" err="1">
-                <a:latin typeface="Trebuchet MS" panose="020B0703020202090204" pitchFamily="34" charset="0"/>
-              </a:rPr>
-              <a:t>oder</a:t>
-            </a:r>
-            <a:r>
-              <a:rPr b="0" dirty="0">
+              <a:t>!</a:t>
+            </a:r>
+            <a:r>
+              <a:rPr lang="de-DE" b="0" dirty="0">
                 <a:latin typeface="Trebuchet MS" panose="020B0703020202090204" pitchFamily="34" charset="0"/>
               </a:rPr>
               <a:t> </a:t>
-            </a:r>
-            <a:r>
-              <a:rPr lang="de-DE" b="0" dirty="0">
-                <a:latin typeface="Trebuchet MS" panose="020B0703020202090204" pitchFamily="34" charset="0"/>
-              </a:rPr>
-              <a:t>Jump &amp; Run als Basis</a:t>
             </a:r>
             <a:endParaRPr b="0" dirty="0">
               <a:latin typeface="Trebuchet MS" panose="020B0703020202090204" pitchFamily="34" charset="0"/>
             </a:endParaRPr>
           </a:p>
+        </p:txBody>
+      </p:sp>
+      <p:sp>
+        <p:nvSpPr>
+          <p:cNvPr id="3" name="Content Placeholder 2"/>
+          <p:cNvSpPr>
+            <a:spLocks noGrp="1"/>
+          </p:cNvSpPr>
+          <p:nvPr>
+            <p:ph idx="1"/>
+          </p:nvPr>
+        </p:nvSpPr>
+        <p:spPr/>
+        <p:txBody>
+          <a:bodyPr/>
+          <a:lstStyle/>
+          <a:p>
+            <a:pPr marL="0" indent="0">
+              <a:buNone/>
+              <a:defRPr sz="2400">
+                <a:solidFill>
+                  <a:srgbClr val="28283C"/>
+                </a:solidFill>
+                <a:latin typeface="Comic Sans MS"/>
+              </a:defRPr>
+            </a:pPr>
+            <a:r>
+              <a:rPr lang="de-DE" dirty="0">
+                <a:latin typeface="Trebuchet MS" panose="020B0703020202090204" pitchFamily="34" charset="0"/>
+              </a:rPr>
+              <a:t>Zum Ablauf:</a:t>
+            </a:r>
+          </a:p>
           <a:p>
             <a:pPr algn="l">
               <a:defRPr sz="2400">
@@ -4601,59 +5528,47 @@
               </a:defRPr>
             </a:pPr>
             <a:r>
+              <a:rPr lang="de-DE" b="0" dirty="0">
+                <a:latin typeface="Trebuchet MS" panose="020B0703020202090204" pitchFamily="34" charset="0"/>
+              </a:rPr>
+              <a:t>Wie geht Programmierung? </a:t>
+            </a:r>
+            <a:r>
               <a:rPr b="0" dirty="0">
                 <a:latin typeface="Trebuchet MS" panose="020B0703020202090204" pitchFamily="34" charset="0"/>
               </a:rPr>
-              <a:t>2️⃣ </a:t>
-            </a:r>
-            <a:r>
-              <a:rPr b="0" dirty="0" err="1">
-                <a:latin typeface="Trebuchet MS" panose="020B0703020202090204" pitchFamily="34" charset="0"/>
-              </a:rPr>
-              <a:t>Überlegt</a:t>
-            </a:r>
-            <a:r>
-              <a:rPr b="0" dirty="0">
-                <a:latin typeface="Trebuchet MS" panose="020B0703020202090204" pitchFamily="34" charset="0"/>
-              </a:rPr>
-              <a:t>, was </a:t>
-            </a:r>
-            <a:r>
-              <a:rPr b="0" dirty="0" err="1">
-                <a:latin typeface="Trebuchet MS" panose="020B0703020202090204" pitchFamily="34" charset="0"/>
-              </a:rPr>
-              <a:t>euer</a:t>
-            </a:r>
-            <a:r>
-              <a:rPr b="0" dirty="0">
-                <a:latin typeface="Trebuchet MS" panose="020B0703020202090204" pitchFamily="34" charset="0"/>
-              </a:rPr>
-              <a:t> Spiel </a:t>
-            </a:r>
-            <a:r>
-              <a:rPr b="0" dirty="0" err="1">
-                <a:latin typeface="Trebuchet MS" panose="020B0703020202090204" pitchFamily="34" charset="0"/>
-              </a:rPr>
-              <a:t>können</a:t>
-            </a:r>
-            <a:r>
-              <a:rPr b="0" dirty="0">
-                <a:latin typeface="Trebuchet MS" panose="020B0703020202090204" pitchFamily="34" charset="0"/>
-              </a:rPr>
-              <a:t> </a:t>
-            </a:r>
-            <a:r>
-              <a:rPr b="0" dirty="0" err="1">
-                <a:latin typeface="Trebuchet MS" panose="020B0703020202090204" pitchFamily="34" charset="0"/>
-              </a:rPr>
-              <a:t>soll</a:t>
+              <a:t>💡</a:t>
+            </a:r>
+          </a:p>
+          <a:p>
+            <a:pPr>
+              <a:defRPr sz="2400">
+                <a:solidFill>
+                  <a:srgbClr val="28283C"/>
+                </a:solidFill>
+                <a:latin typeface="Comic Sans MS"/>
+              </a:defRPr>
+            </a:pPr>
+            <a:r>
+              <a:rPr lang="de-DE" b="0" dirty="0">
+                <a:latin typeface="Trebuchet MS" panose="020B0703020202090204" pitchFamily="34" charset="0"/>
+              </a:rPr>
+              <a:t>Was braucht es für ein Spiel? </a:t>
+            </a:r>
+            <a:r>
+              <a:rPr lang="de-DE" dirty="0">
+                <a:latin typeface="Trebuchet MS" panose="020B0703020202090204" pitchFamily="34" charset="0"/>
+                <a:ea typeface="ADLaM Display" panose="02010000000000000000" pitchFamily="2" charset="77"/>
+                <a:cs typeface="ADLaM Display" panose="02010000000000000000" pitchFamily="2" charset="77"/>
+              </a:rPr>
+              <a:t>🎮</a:t>
             </a:r>
             <a:endParaRPr b="0" dirty="0">
               <a:latin typeface="Trebuchet MS" panose="020B0703020202090204" pitchFamily="34" charset="0"/>
             </a:endParaRPr>
           </a:p>
           <a:p>
-            <a:pPr algn="l">
+            <a:pPr>
               <a:defRPr sz="2400">
                 <a:solidFill>
                   <a:srgbClr val="28283C"/>
@@ -4662,35 +5577,191 @@
               </a:defRPr>
             </a:pPr>
             <a:r>
-              <a:rPr b="0" dirty="0">
-                <a:latin typeface="Trebuchet MS" panose="020B0703020202090204" pitchFamily="34" charset="0"/>
-              </a:rPr>
-              <a:t>3️⃣ </a:t>
-            </a:r>
-            <a:r>
-              <a:rPr b="0" dirty="0" err="1">
-                <a:latin typeface="Trebuchet MS" panose="020B0703020202090204" pitchFamily="34" charset="0"/>
-              </a:rPr>
-              <a:t>Nutzt</a:t>
-            </a:r>
-            <a:r>
-              <a:rPr b="0" dirty="0">
-                <a:latin typeface="Trebuchet MS" panose="020B0703020202090204" pitchFamily="34" charset="0"/>
-              </a:rPr>
-              <a:t> KI, um Ideen </a:t>
-            </a:r>
-            <a:r>
-              <a:rPr b="0" dirty="0" err="1">
-                <a:latin typeface="Trebuchet MS" panose="020B0703020202090204" pitchFamily="34" charset="0"/>
-              </a:rPr>
-              <a:t>umzusetzen</a:t>
+              <a:rPr lang="de-DE" b="0" dirty="0">
+                <a:latin typeface="Trebuchet MS" panose="020B0703020202090204" pitchFamily="34" charset="0"/>
+              </a:rPr>
+              <a:t>Was ist KI und wie hilft sie uns? </a:t>
+            </a:r>
+            <a:r>
+              <a:rPr lang="de-DE" dirty="0"/>
+              <a:t>🤖</a:t>
+            </a:r>
+          </a:p>
+          <a:p>
+            <a:pPr>
+              <a:defRPr sz="2400">
+                <a:solidFill>
+                  <a:srgbClr val="28283C"/>
+                </a:solidFill>
+                <a:latin typeface="Comic Sans MS"/>
+              </a:defRPr>
+            </a:pPr>
+            <a:endParaRPr lang="de-DE" b="0" dirty="0">
+              <a:latin typeface="Trebuchet MS" panose="020B0703020202090204" pitchFamily="34" charset="0"/>
+            </a:endParaRPr>
+          </a:p>
+          <a:p>
+            <a:pPr marL="0" indent="0">
+              <a:buNone/>
+              <a:defRPr sz="2400">
+                <a:solidFill>
+                  <a:srgbClr val="28283C"/>
+                </a:solidFill>
+                <a:latin typeface="Comic Sans MS"/>
+              </a:defRPr>
+            </a:pPr>
+            <a:r>
+              <a:rPr lang="de-DE" b="0" dirty="0">
+                <a:latin typeface="Trebuchet MS" panose="020B0703020202090204" pitchFamily="34" charset="0"/>
+              </a:rPr>
+              <a:t>Wer steht auf? </a:t>
             </a:r>
             <a:endParaRPr b="0" dirty="0">
               <a:latin typeface="Trebuchet MS" panose="020B0703020202090204" pitchFamily="34" charset="0"/>
             </a:endParaRPr>
           </a:p>
-          <a:p>
-            <a:pPr algn="l">
+        </p:txBody>
+      </p:sp>
+    </p:spTree>
+  </p:cSld>
+  <p:clrMapOvr>
+    <a:masterClrMapping/>
+  </p:clrMapOvr>
+  <p:timing>
+    <p:tnLst>
+      <p:par>
+        <p:cTn id="1" dur="indefinite" restart="never" nodeType="tmRoot">
+          <p:childTnLst>
+            <p:seq concurrent="1" nextAc="seek">
+              <p:cTn id="2" dur="indefinite" nodeType="mainSeq">
+                <p:childTnLst>
+                  <p:par>
+                    <p:cTn id="3" fill="hold">
+                      <p:stCondLst>
+                        <p:cond delay="indefinite"/>
+                      </p:stCondLst>
+                      <p:childTnLst>
+                        <p:par>
+                          <p:cTn id="4" fill="hold">
+                            <p:stCondLst>
+                              <p:cond delay="0"/>
+                            </p:stCondLst>
+                            <p:childTnLst>
+                              <p:par>
+                                <p:cTn id="5" presetID="1" presetClass="entr" presetSubtype="0" fill="hold" nodeType="clickEffect">
+                                  <p:stCondLst>
+                                    <p:cond delay="0"/>
+                                  </p:stCondLst>
+                                  <p:childTnLst>
+                                    <p:set>
+                                      <p:cBhvr>
+                                        <p:cTn id="6" dur="1" fill="hold">
+                                          <p:stCondLst>
+                                            <p:cond delay="0"/>
+                                          </p:stCondLst>
+                                        </p:cTn>
+                                        <p:tgtEl>
+                                          <p:spTgt spid="3">
+                                            <p:txEl>
+                                              <p:pRg st="5" end="5"/>
+                                            </p:txEl>
+                                          </p:spTgt>
+                                        </p:tgtEl>
+                                        <p:attrNameLst>
+                                          <p:attrName>style.visibility</p:attrName>
+                                        </p:attrNameLst>
+                                      </p:cBhvr>
+                                      <p:to>
+                                        <p:strVal val="visible"/>
+                                      </p:to>
+                                    </p:set>
+                                  </p:childTnLst>
+                                </p:cTn>
+                              </p:par>
+                            </p:childTnLst>
+                          </p:cTn>
+                        </p:par>
+                      </p:childTnLst>
+                    </p:cTn>
+                  </p:par>
+                </p:childTnLst>
+              </p:cTn>
+              <p:prevCondLst>
+                <p:cond evt="onPrev" delay="0">
+                  <p:tgtEl>
+                    <p:sldTgt/>
+                  </p:tgtEl>
+                </p:cond>
+              </p:prevCondLst>
+              <p:nextCondLst>
+                <p:cond evt="onNext" delay="0">
+                  <p:tgtEl>
+                    <p:sldTgt/>
+                  </p:tgtEl>
+                </p:cond>
+              </p:nextCondLst>
+            </p:seq>
+          </p:childTnLst>
+        </p:cTn>
+      </p:par>
+    </p:tnLst>
+  </p:timing>
+</p:sld>
+</file>
+
+<file path=ppt/slides/slide20.xml><?xml version="1.0" encoding="utf-8"?>
+<p:sld xmlns:a="http://schemas.openxmlformats.org/drawingml/2006/main" xmlns:r="http://schemas.openxmlformats.org/officeDocument/2006/relationships" xmlns:p="http://schemas.openxmlformats.org/presentationml/2006/main">
+  <p:cSld>
+    <p:bg>
+      <p:bgPr>
+        <a:solidFill>
+          <a:srgbClr val="E6F0FF"/>
+        </a:solidFill>
+        <a:effectLst/>
+      </p:bgPr>
+    </p:bg>
+    <p:spTree>
+      <p:nvGrpSpPr>
+        <p:cNvPr id="1" name="">
+          <a:extLst>
+            <a:ext uri="{FF2B5EF4-FFF2-40B4-BE49-F238E27FC236}">
+              <a16:creationId xmlns:a16="http://schemas.microsoft.com/office/drawing/2014/main" id="{79BECFDE-B748-91C8-D65E-14F982563E5D}"/>
+            </a:ext>
+          </a:extLst>
+        </p:cNvPr>
+        <p:cNvGrpSpPr/>
+        <p:nvPr/>
+      </p:nvGrpSpPr>
+      <p:grpSpPr>
+        <a:xfrm>
+          <a:off x="0" y="0"/>
+          <a:ext cx="0" cy="0"/>
+          <a:chOff x="0" y="0"/>
+          <a:chExt cx="0" cy="0"/>
+        </a:xfrm>
+      </p:grpSpPr>
+      <p:sp>
+        <p:nvSpPr>
+          <p:cNvPr id="2" name="Title 1">
+            <a:extLst>
+              <a:ext uri="{FF2B5EF4-FFF2-40B4-BE49-F238E27FC236}">
+                <a16:creationId xmlns:a16="http://schemas.microsoft.com/office/drawing/2014/main" id="{9893A25D-DC97-64EF-91E7-369DFF39A400}"/>
+              </a:ext>
+            </a:extLst>
+          </p:cNvPr>
+          <p:cNvSpPr>
+            <a:spLocks noGrp="1"/>
+          </p:cNvSpPr>
+          <p:nvPr>
+            <p:ph type="title"/>
+          </p:nvPr>
+        </p:nvSpPr>
+        <p:spPr/>
+        <p:txBody>
+          <a:bodyPr/>
+          <a:lstStyle/>
+          <a:p>
+            <a:pPr>
               <a:defRPr sz="2400">
                 <a:solidFill>
                   <a:srgbClr val="28283C"/>
@@ -4699,40 +5770,16 @@
               </a:defRPr>
             </a:pPr>
             <a:r>
-              <a:rPr b="0" dirty="0">
-                <a:latin typeface="Trebuchet MS" panose="020B0703020202090204" pitchFamily="34" charset="0"/>
-              </a:rPr>
-              <a:t>4️⃣ </a:t>
-            </a:r>
-            <a:r>
-              <a:rPr b="0" dirty="0" err="1">
-                <a:latin typeface="Trebuchet MS" panose="020B0703020202090204" pitchFamily="34" charset="0"/>
-              </a:rPr>
-              <a:t>Testet</a:t>
-            </a:r>
-            <a:r>
-              <a:rPr b="0" dirty="0">
-                <a:latin typeface="Trebuchet MS" panose="020B0703020202090204" pitchFamily="34" charset="0"/>
-              </a:rPr>
-              <a:t> und </a:t>
-            </a:r>
-            <a:r>
-              <a:rPr b="0" dirty="0" err="1">
-                <a:latin typeface="Trebuchet MS" panose="020B0703020202090204" pitchFamily="34" charset="0"/>
-              </a:rPr>
-              <a:t>verbessert</a:t>
-            </a:r>
-            <a:r>
-              <a:rPr b="0" dirty="0">
-                <a:latin typeface="Trebuchet MS" panose="020B0703020202090204" pitchFamily="34" charset="0"/>
-              </a:rPr>
-              <a:t> </a:t>
-            </a:r>
-            <a:r>
-              <a:rPr b="0" dirty="0" err="1">
-                <a:latin typeface="Trebuchet MS" panose="020B0703020202090204" pitchFamily="34" charset="0"/>
-              </a:rPr>
-              <a:t>gemeinsam</a:t>
+              <a:rPr lang="de-DE" b="0" dirty="0">
+                <a:latin typeface="Trebuchet MS" panose="020B0703020202090204" pitchFamily="34" charset="0"/>
+              </a:rPr>
+              <a:t>KI kann Fehler einbauen </a:t>
+            </a:r>
+            <a:r>
+              <a:rPr lang="de-DE" dirty="0">
+                <a:latin typeface="Trebuchet MS" panose="020B0703020202090204" pitchFamily="34" charset="0"/>
+              </a:rPr>
+              <a:t>🤖</a:t>
             </a:r>
             <a:endParaRPr b="0" dirty="0">
               <a:latin typeface="Trebuchet MS" panose="020B0703020202090204" pitchFamily="34" charset="0"/>
@@ -4740,7 +5787,42 @@
           </a:p>
         </p:txBody>
       </p:sp>
+      <p:pic>
+        <p:nvPicPr>
+          <p:cNvPr id="3" name="Grafik 2">
+            <a:extLst>
+              <a:ext uri="{FF2B5EF4-FFF2-40B4-BE49-F238E27FC236}">
+                <a16:creationId xmlns:a16="http://schemas.microsoft.com/office/drawing/2014/main" id="{B5B37475-6333-1381-ABB9-160BED468145}"/>
+              </a:ext>
+            </a:extLst>
+          </p:cNvPr>
+          <p:cNvPicPr>
+            <a:picLocks noChangeAspect="1"/>
+          </p:cNvPicPr>
+          <p:nvPr/>
+        </p:nvPicPr>
+        <p:blipFill>
+          <a:blip r:embed="rId2"/>
+          <a:stretch>
+            <a:fillRect/>
+          </a:stretch>
+        </p:blipFill>
+        <p:spPr>
+          <a:xfrm>
+            <a:off x="2291198" y="1817370"/>
+            <a:ext cx="4561603" cy="4326890"/>
+          </a:xfrm>
+          <a:prstGeom prst="rect">
+            <a:avLst/>
+          </a:prstGeom>
+        </p:spPr>
+      </p:pic>
     </p:spTree>
+    <p:extLst>
+      <p:ext uri="{BB962C8B-B14F-4D97-AF65-F5344CB8AC3E}">
+        <p14:creationId xmlns:p14="http://schemas.microsoft.com/office/powerpoint/2010/main" val="2559030169"/>
+      </p:ext>
+    </p:extLst>
   </p:cSld>
   <p:clrMapOvr>
     <a:masterClrMapping/>
@@ -4748,7 +5830,7 @@
 </p:sld>
 </file>
 
-<file path=ppt/slides/slide17.xml><?xml version="1.0" encoding="utf-8"?>
+<file path=ppt/slides/slide21.xml><?xml version="1.0" encoding="utf-8"?>
 <p:sld xmlns:a="http://schemas.openxmlformats.org/drawingml/2006/main" xmlns:r="http://schemas.openxmlformats.org/officeDocument/2006/relationships" xmlns:p="http://schemas.openxmlformats.org/presentationml/2006/main">
   <p:cSld>
     <p:bg>
@@ -4797,22 +5879,16 @@
               </a:defRPr>
             </a:pPr>
             <a:r>
+              <a:rPr lang="de-DE" b="0" dirty="0">
+                <a:latin typeface="Trebuchet MS" panose="020B0703020202090204" pitchFamily="34" charset="0"/>
+              </a:rPr>
+              <a:t>Eure Game-Show </a:t>
+            </a:r>
+            <a:r>
               <a:rPr b="0" dirty="0">
                 <a:latin typeface="Trebuchet MS" panose="020B0703020202090204" pitchFamily="34" charset="0"/>
               </a:rPr>
-              <a:t>Ideen für </a:t>
-            </a:r>
-            <a:r>
-              <a:rPr b="0" dirty="0" err="1">
-                <a:latin typeface="Trebuchet MS" panose="020B0703020202090204" pitchFamily="34" charset="0"/>
-              </a:rPr>
-              <a:t>euer</a:t>
-            </a:r>
-            <a:r>
-              <a:rPr b="0" dirty="0">
-                <a:latin typeface="Trebuchet MS" panose="020B0703020202090204" pitchFamily="34" charset="0"/>
-              </a:rPr>
-              <a:t> Spiel 🌟</a:t>
+              <a:t>🎉</a:t>
             </a:r>
           </a:p>
         </p:txBody>
@@ -4844,9 +5920,39 @@
               <a:rPr b="0" dirty="0" err="1">
                 <a:latin typeface="Trebuchet MS" panose="020B0703020202090204" pitchFamily="34" charset="0"/>
               </a:rPr>
-              <a:t>Doppelsprung</a:t>
-            </a:r>
-            <a:endParaRPr b="0" dirty="0">
+              <a:t>Jedes</a:t>
+            </a:r>
+            <a:r>
+              <a:rPr b="0" dirty="0">
+                <a:latin typeface="Trebuchet MS" panose="020B0703020202090204" pitchFamily="34" charset="0"/>
+              </a:rPr>
+              <a:t> Team </a:t>
+            </a:r>
+            <a:r>
+              <a:rPr b="0" dirty="0" err="1">
+                <a:latin typeface="Trebuchet MS" panose="020B0703020202090204" pitchFamily="34" charset="0"/>
+              </a:rPr>
+              <a:t>zeigt</a:t>
+            </a:r>
+            <a:r>
+              <a:rPr b="0" dirty="0">
+                <a:latin typeface="Trebuchet MS" panose="020B0703020202090204" pitchFamily="34" charset="0"/>
+              </a:rPr>
+              <a:t> </a:t>
+            </a:r>
+            <a:r>
+              <a:rPr b="0" dirty="0" err="1">
+                <a:latin typeface="Trebuchet MS" panose="020B0703020202090204" pitchFamily="34" charset="0"/>
+              </a:rPr>
+              <a:t>kurz</a:t>
+            </a:r>
+            <a:r>
+              <a:rPr b="0" dirty="0">
+                <a:latin typeface="Trebuchet MS" panose="020B0703020202090204" pitchFamily="34" charset="0"/>
+              </a:rPr>
+              <a:t> sein Spiel!</a:t>
+            </a:r>
+            <a:endParaRPr lang="de-DE" dirty="0">
               <a:latin typeface="Trebuchet MS" panose="020B0703020202090204" pitchFamily="34" charset="0"/>
             </a:endParaRPr>
           </a:p>
@@ -4860,123 +5966,41 @@
               </a:defRPr>
             </a:pPr>
             <a:r>
+              <a:rPr b="0" dirty="0" err="1">
+                <a:latin typeface="Trebuchet MS" panose="020B0703020202090204" pitchFamily="34" charset="0"/>
+              </a:rPr>
+              <a:t>Applaus</a:t>
+            </a:r>
+            <a:r>
               <a:rPr b="0" dirty="0">
                 <a:latin typeface="Trebuchet MS" panose="020B0703020202090204" pitchFamily="34" charset="0"/>
               </a:rPr>
-              <a:t>Sterne </a:t>
+              <a:t> für alle </a:t>
             </a:r>
             <a:r>
               <a:rPr b="0" dirty="0" err="1">
                 <a:latin typeface="Trebuchet MS" panose="020B0703020202090204" pitchFamily="34" charset="0"/>
               </a:rPr>
-              <a:t>einsammeln</a:t>
+              <a:t>Entwicklerinnen</a:t>
             </a:r>
             <a:r>
               <a:rPr b="0" dirty="0">
                 <a:latin typeface="Trebuchet MS" panose="020B0703020202090204" pitchFamily="34" charset="0"/>
               </a:rPr>
-              <a:t> ⭐</a:t>
-            </a:r>
-          </a:p>
-          <a:p>
-            <a:pPr algn="l">
-              <a:defRPr sz="2400">
-                <a:solidFill>
-                  <a:srgbClr val="28283C"/>
-                </a:solidFill>
-                <a:latin typeface="Comic Sans MS"/>
-              </a:defRPr>
-            </a:pPr>
+              <a:t> &amp; </a:t>
+            </a:r>
             <a:r>
               <a:rPr b="0" dirty="0" err="1">
                 <a:latin typeface="Trebuchet MS" panose="020B0703020202090204" pitchFamily="34" charset="0"/>
               </a:rPr>
-              <a:t>Farbwechsel</a:t>
-            </a:r>
-            <a:endParaRPr b="0" dirty="0">
-              <a:latin typeface="Trebuchet MS" panose="020B0703020202090204" pitchFamily="34" charset="0"/>
-            </a:endParaRPr>
-          </a:p>
-          <a:p>
-            <a:pPr algn="l">
-              <a:defRPr sz="2400">
-                <a:solidFill>
-                  <a:srgbClr val="28283C"/>
-                </a:solidFill>
-                <a:latin typeface="Comic Sans MS"/>
-              </a:defRPr>
-            </a:pPr>
+              <a:t>Entwickler</a:t>
+            </a:r>
             <a:r>
               <a:rPr b="0" dirty="0">
                 <a:latin typeface="Trebuchet MS" panose="020B0703020202090204" pitchFamily="34" charset="0"/>
               </a:rPr>
-              <a:t>Gegner </a:t>
-            </a:r>
-            <a:r>
-              <a:rPr b="0" dirty="0" err="1">
-                <a:latin typeface="Trebuchet MS" panose="020B0703020202090204" pitchFamily="34" charset="0"/>
-              </a:rPr>
-              <a:t>oder</a:t>
-            </a:r>
-            <a:r>
-              <a:rPr b="0" dirty="0">
-                <a:latin typeface="Trebuchet MS" panose="020B0703020202090204" pitchFamily="34" charset="0"/>
-              </a:rPr>
-              <a:t> </a:t>
-            </a:r>
-            <a:r>
-              <a:rPr b="0" dirty="0" err="1">
-                <a:latin typeface="Trebuchet MS" panose="020B0703020202090204" pitchFamily="34" charset="0"/>
-              </a:rPr>
-              <a:t>Hindernisse</a:t>
-            </a:r>
-            <a:endParaRPr b="0" dirty="0">
-              <a:latin typeface="Trebuchet MS" panose="020B0703020202090204" pitchFamily="34" charset="0"/>
-            </a:endParaRPr>
-          </a:p>
-          <a:p>
-            <a:pPr algn="l">
-              <a:defRPr sz="2400">
-                <a:solidFill>
-                  <a:srgbClr val="28283C"/>
-                </a:solidFill>
-                <a:latin typeface="Comic Sans MS"/>
-              </a:defRPr>
-            </a:pPr>
-            <a:r>
-              <a:rPr b="0" dirty="0" err="1">
-                <a:latin typeface="Trebuchet MS" panose="020B0703020202090204" pitchFamily="34" charset="0"/>
-              </a:rPr>
-              <a:t>Punkte</a:t>
-            </a:r>
-            <a:r>
-              <a:rPr b="0" dirty="0">
-                <a:latin typeface="Trebuchet MS" panose="020B0703020202090204" pitchFamily="34" charset="0"/>
-              </a:rPr>
-              <a:t> &amp; Level</a:t>
-            </a:r>
-            <a:endParaRPr lang="de-DE" b="0" dirty="0">
-              <a:latin typeface="Trebuchet MS" panose="020B0703020202090204" pitchFamily="34" charset="0"/>
-            </a:endParaRPr>
-          </a:p>
-          <a:p>
-            <a:pPr algn="l">
-              <a:defRPr sz="2400">
-                <a:solidFill>
-                  <a:srgbClr val="28283C"/>
-                </a:solidFill>
-                <a:latin typeface="Comic Sans MS"/>
-              </a:defRPr>
-            </a:pPr>
-            <a:r>
-              <a:rPr lang="de-DE" dirty="0">
-                <a:latin typeface="Trebuchet MS" panose="020B0703020202090204" pitchFamily="34" charset="0"/>
-              </a:rPr>
-              <a:t>Sounds</a:t>
-            </a:r>
-            <a:endParaRPr b="0" dirty="0">
-              <a:latin typeface="Trebuchet MS" panose="020B0703020202090204" pitchFamily="34" charset="0"/>
-            </a:endParaRPr>
+              <a:t> 👏</a:t>
+            </a:r>
           </a:p>
         </p:txBody>
       </p:sp>
@@ -4988,126 +6012,7 @@
 </p:sld>
 </file>
 
-<file path=ppt/slides/slide18.xml><?xml version="1.0" encoding="utf-8"?>
-<p:sld xmlns:a="http://schemas.openxmlformats.org/drawingml/2006/main" xmlns:r="http://schemas.openxmlformats.org/officeDocument/2006/relationships" xmlns:p="http://schemas.openxmlformats.org/presentationml/2006/main">
-  <p:cSld>
-    <p:bg>
-      <p:bgPr>
-        <a:solidFill>
-          <a:srgbClr val="E6F0FF"/>
-        </a:solidFill>
-        <a:effectLst/>
-      </p:bgPr>
-    </p:bg>
-    <p:spTree>
-      <p:nvGrpSpPr>
-        <p:cNvPr id="1" name=""/>
-        <p:cNvGrpSpPr/>
-        <p:nvPr/>
-      </p:nvGrpSpPr>
-      <p:grpSpPr>
-        <a:xfrm>
-          <a:off x="0" y="0"/>
-          <a:ext cx="0" cy="0"/>
-          <a:chOff x="0" y="0"/>
-          <a:chExt cx="0" cy="0"/>
-        </a:xfrm>
-      </p:grpSpPr>
-      <p:sp>
-        <p:nvSpPr>
-          <p:cNvPr id="2" name="Title 1"/>
-          <p:cNvSpPr>
-            <a:spLocks noGrp="1"/>
-          </p:cNvSpPr>
-          <p:nvPr>
-            <p:ph type="title"/>
-          </p:nvPr>
-        </p:nvSpPr>
-        <p:spPr/>
-        <p:txBody>
-          <a:bodyPr/>
-          <a:lstStyle/>
-          <a:p>
-            <a:pPr>
-              <a:defRPr sz="2400">
-                <a:solidFill>
-                  <a:srgbClr val="28283C"/>
-                </a:solidFill>
-                <a:latin typeface="Comic Sans MS"/>
-              </a:defRPr>
-            </a:pPr>
-            <a:r>
-              <a:rPr lang="de-DE" b="0" dirty="0">
-                <a:latin typeface="Trebuchet MS" panose="020B0703020202090204" pitchFamily="34" charset="0"/>
-              </a:rPr>
-              <a:t>Eure Game-Show </a:t>
-            </a:r>
-            <a:r>
-              <a:rPr b="0" dirty="0">
-                <a:latin typeface="Trebuchet MS" panose="020B0703020202090204" pitchFamily="34" charset="0"/>
-              </a:rPr>
-              <a:t>🎉</a:t>
-            </a:r>
-          </a:p>
-        </p:txBody>
-      </p:sp>
-      <p:sp>
-        <p:nvSpPr>
-          <p:cNvPr id="3" name="Content Placeholder 2"/>
-          <p:cNvSpPr>
-            <a:spLocks noGrp="1"/>
-          </p:cNvSpPr>
-          <p:nvPr>
-            <p:ph idx="1"/>
-          </p:nvPr>
-        </p:nvSpPr>
-        <p:spPr/>
-        <p:txBody>
-          <a:bodyPr/>
-          <a:lstStyle/>
-          <a:p>
-            <a:pPr algn="l">
-              <a:defRPr sz="2400">
-                <a:solidFill>
-                  <a:srgbClr val="28283C"/>
-                </a:solidFill>
-                <a:latin typeface="Comic Sans MS"/>
-              </a:defRPr>
-            </a:pPr>
-            <a:r>
-              <a:rPr b="0">
-                <a:latin typeface="Trebuchet MS" panose="020B0703020202090204" pitchFamily="34" charset="0"/>
-              </a:rPr>
-              <a:t>Jedes Team zeigt kurz sein Spiel!</a:t>
-            </a:r>
-          </a:p>
-          <a:p>
-            <a:pPr algn="l">
-              <a:defRPr sz="2400">
-                <a:solidFill>
-                  <a:srgbClr val="28283C"/>
-                </a:solidFill>
-                <a:latin typeface="Comic Sans MS"/>
-              </a:defRPr>
-            </a:pPr>
-            <a:r>
-              <a:rPr b="0">
-                <a:latin typeface="Trebuchet MS" panose="020B0703020202090204" pitchFamily="34" charset="0"/>
-              </a:rPr>
-              <a:t>Applaus für alle Entwicklerinnen &amp; Entwickler 👏</a:t>
-            </a:r>
-          </a:p>
-        </p:txBody>
-      </p:sp>
-    </p:spTree>
-  </p:cSld>
-  <p:clrMapOvr>
-    <a:masterClrMapping/>
-  </p:clrMapOvr>
-</p:sld>
-</file>
-
-<file path=ppt/slides/slide19.xml><?xml version="1.0" encoding="utf-8"?>
+<file path=ppt/slides/slide22.xml><?xml version="1.0" encoding="utf-8"?>
 <p:sld xmlns:a="http://schemas.openxmlformats.org/drawingml/2006/main" xmlns:r="http://schemas.openxmlformats.org/officeDocument/2006/relationships" xmlns:p="http://schemas.openxmlformats.org/presentationml/2006/main">
   <p:cSld>
     <p:bg>
@@ -5506,197 +6411,6 @@
 </p:sld>
 </file>
 
-<file path=ppt/slides/slide2.xml><?xml version="1.0" encoding="utf-8"?>
-<p:sld xmlns:a="http://schemas.openxmlformats.org/drawingml/2006/main" xmlns:r="http://schemas.openxmlformats.org/officeDocument/2006/relationships" xmlns:p="http://schemas.openxmlformats.org/presentationml/2006/main">
-  <p:cSld>
-    <p:bg>
-      <p:bgPr>
-        <a:solidFill>
-          <a:srgbClr val="E6F0FF"/>
-        </a:solidFill>
-        <a:effectLst/>
-      </p:bgPr>
-    </p:bg>
-    <p:spTree>
-      <p:nvGrpSpPr>
-        <p:cNvPr id="1" name=""/>
-        <p:cNvGrpSpPr/>
-        <p:nvPr/>
-      </p:nvGrpSpPr>
-      <p:grpSpPr>
-        <a:xfrm>
-          <a:off x="0" y="0"/>
-          <a:ext cx="0" cy="0"/>
-          <a:chOff x="0" y="0"/>
-          <a:chExt cx="0" cy="0"/>
-        </a:xfrm>
-      </p:grpSpPr>
-      <p:sp>
-        <p:nvSpPr>
-          <p:cNvPr id="2" name="Title 1"/>
-          <p:cNvSpPr>
-            <a:spLocks noGrp="1"/>
-          </p:cNvSpPr>
-          <p:nvPr>
-            <p:ph type="title"/>
-          </p:nvPr>
-        </p:nvSpPr>
-        <p:spPr/>
-        <p:txBody>
-          <a:bodyPr/>
-          <a:lstStyle/>
-          <a:p>
-            <a:pPr>
-              <a:defRPr sz="2400">
-                <a:solidFill>
-                  <a:srgbClr val="28283C"/>
-                </a:solidFill>
-                <a:latin typeface="Comic Sans MS"/>
-              </a:defRPr>
-            </a:pPr>
-            <a:r>
-              <a:rPr b="0" dirty="0" err="1">
-                <a:latin typeface="Trebuchet MS" panose="020B0703020202090204" pitchFamily="34" charset="0"/>
-              </a:rPr>
-              <a:t>Willkommen</a:t>
-            </a:r>
-            <a:r>
-              <a:rPr b="0" dirty="0">
-                <a:latin typeface="Trebuchet MS" panose="020B0703020202090204" pitchFamily="34" charset="0"/>
-              </a:rPr>
-              <a:t>!</a:t>
-            </a:r>
-            <a:r>
-              <a:rPr lang="de-DE" b="0" dirty="0">
-                <a:latin typeface="Trebuchet MS" panose="020B0703020202090204" pitchFamily="34" charset="0"/>
-              </a:rPr>
-              <a:t> </a:t>
-            </a:r>
-            <a:endParaRPr b="0" dirty="0">
-              <a:latin typeface="Trebuchet MS" panose="020B0703020202090204" pitchFamily="34" charset="0"/>
-            </a:endParaRPr>
-          </a:p>
-        </p:txBody>
-      </p:sp>
-      <p:sp>
-        <p:nvSpPr>
-          <p:cNvPr id="3" name="Content Placeholder 2"/>
-          <p:cNvSpPr>
-            <a:spLocks noGrp="1"/>
-          </p:cNvSpPr>
-          <p:nvPr>
-            <p:ph idx="1"/>
-          </p:nvPr>
-        </p:nvSpPr>
-        <p:spPr/>
-        <p:txBody>
-          <a:bodyPr/>
-          <a:lstStyle/>
-          <a:p>
-            <a:pPr marL="0" indent="0">
-              <a:buNone/>
-              <a:defRPr sz="2400">
-                <a:solidFill>
-                  <a:srgbClr val="28283C"/>
-                </a:solidFill>
-                <a:latin typeface="Comic Sans MS"/>
-              </a:defRPr>
-            </a:pPr>
-            <a:r>
-              <a:rPr lang="de-DE" dirty="0">
-                <a:latin typeface="Trebuchet MS" panose="020B0703020202090204" pitchFamily="34" charset="0"/>
-              </a:rPr>
-              <a:t>Zum Ablauf:</a:t>
-            </a:r>
-          </a:p>
-          <a:p>
-            <a:pPr algn="l">
-              <a:defRPr sz="2400">
-                <a:solidFill>
-                  <a:srgbClr val="28283C"/>
-                </a:solidFill>
-                <a:latin typeface="Comic Sans MS"/>
-              </a:defRPr>
-            </a:pPr>
-            <a:r>
-              <a:rPr lang="de-DE" b="0" dirty="0">
-                <a:latin typeface="Trebuchet MS" panose="020B0703020202090204" pitchFamily="34" charset="0"/>
-              </a:rPr>
-              <a:t>Wie geht Programmierung? </a:t>
-            </a:r>
-            <a:r>
-              <a:rPr b="0" dirty="0">
-                <a:latin typeface="Trebuchet MS" panose="020B0703020202090204" pitchFamily="34" charset="0"/>
-              </a:rPr>
-              <a:t>💡</a:t>
-            </a:r>
-          </a:p>
-          <a:p>
-            <a:pPr>
-              <a:defRPr sz="2400">
-                <a:solidFill>
-                  <a:srgbClr val="28283C"/>
-                </a:solidFill>
-                <a:latin typeface="Comic Sans MS"/>
-              </a:defRPr>
-            </a:pPr>
-            <a:r>
-              <a:rPr lang="de-DE" b="0" dirty="0">
-                <a:latin typeface="Trebuchet MS" panose="020B0703020202090204" pitchFamily="34" charset="0"/>
-              </a:rPr>
-              <a:t>Was braucht es für ein Spiel? </a:t>
-            </a:r>
-            <a:r>
-              <a:rPr lang="de-DE" dirty="0">
-                <a:latin typeface="Trebuchet MS" panose="020B0703020202090204" pitchFamily="34" charset="0"/>
-                <a:ea typeface="ADLaM Display" panose="02010000000000000000" pitchFamily="2" charset="77"/>
-                <a:cs typeface="ADLaM Display" panose="02010000000000000000" pitchFamily="2" charset="77"/>
-              </a:rPr>
-              <a:t>🎮</a:t>
-            </a:r>
-            <a:endParaRPr b="0" dirty="0">
-              <a:latin typeface="Trebuchet MS" panose="020B0703020202090204" pitchFamily="34" charset="0"/>
-            </a:endParaRPr>
-          </a:p>
-          <a:p>
-            <a:pPr>
-              <a:defRPr sz="2400">
-                <a:solidFill>
-                  <a:srgbClr val="28283C"/>
-                </a:solidFill>
-                <a:latin typeface="Comic Sans MS"/>
-              </a:defRPr>
-            </a:pPr>
-            <a:r>
-              <a:rPr lang="de-DE" b="0" dirty="0">
-                <a:latin typeface="Trebuchet MS" panose="020B0703020202090204" pitchFamily="34" charset="0"/>
-              </a:rPr>
-              <a:t>Was ist KI und wie hilft sie uns? </a:t>
-            </a:r>
-            <a:r>
-              <a:rPr lang="de-DE" dirty="0"/>
-              <a:t>🤖</a:t>
-            </a:r>
-            <a:r>
-              <a:rPr lang="de-DE" b="0" dirty="0">
-                <a:latin typeface="Trebuchet MS" panose="020B0703020202090204" pitchFamily="34" charset="0"/>
-              </a:rPr>
-              <a:t> </a:t>
-            </a:r>
-            <a:endParaRPr b="0" dirty="0">
-              <a:latin typeface="Trebuchet MS" panose="020B0703020202090204" pitchFamily="34" charset="0"/>
-            </a:endParaRPr>
-          </a:p>
-        </p:txBody>
-      </p:sp>
-    </p:spTree>
-  </p:cSld>
-  <p:clrMapOvr>
-    <a:masterClrMapping/>
-  </p:clrMapOvr>
-</p:sld>
-</file>
-
 <file path=ppt/slides/slide3.xml><?xml version="1.0" encoding="utf-8"?>
 <p:sld xmlns:a="http://schemas.openxmlformats.org/drawingml/2006/main" xmlns:r="http://schemas.openxmlformats.org/officeDocument/2006/relationships" xmlns:p="http://schemas.openxmlformats.org/presentationml/2006/main">
   <p:cSld>
@@ -5752,10 +6466,10 @@
               <a:t>Was </a:t>
             </a:r>
             <a:r>
-              <a:rPr b="0" dirty="0" err="1">
-                <a:latin typeface="Trebuchet MS" panose="020B0703020202090204" pitchFamily="34" charset="0"/>
-              </a:rPr>
-              <a:t>ist</a:t>
+              <a:rPr lang="de-DE" b="0" dirty="0">
+                <a:latin typeface="Trebuchet MS" panose="020B0703020202090204" pitchFamily="34" charset="0"/>
+              </a:rPr>
+              <a:t>wisst ihr über</a:t>
             </a:r>
             <a:r>
               <a:rPr b="0" dirty="0">
@@ -5818,7 +6532,7 @@
           <a:lstStyle/>
           <a:p>
             <a:pPr algn="ctr"/>
-            <a:endParaRPr lang="de-DE"/>
+            <a:endParaRPr lang="de-DE" dirty="0"/>
           </a:p>
         </p:txBody>
       </p:sp>
@@ -5862,7 +6576,7 @@
           <a:lstStyle/>
           <a:p>
             <a:pPr algn="ctr"/>
-            <a:endParaRPr lang="de-DE"/>
+            <a:endParaRPr lang="de-DE" dirty="0"/>
           </a:p>
         </p:txBody>
       </p:sp>
@@ -5906,7 +6620,11 @@
           <a:lstStyle/>
           <a:p>
             <a:pPr algn="ctr"/>
-            <a:endParaRPr lang="de-DE"/>
+            <a:endParaRPr lang="de-DE">
+              <a:solidFill>
+                <a:schemeClr val="tx1"/>
+              </a:solidFill>
+            </a:endParaRPr>
           </a:p>
         </p:txBody>
       </p:sp>
@@ -6315,8 +7033,12 @@
           <a:p>
             <a:pPr algn="ctr"/>
             <a:r>
+              <a:rPr lang="de-DE" b="1" dirty="0"/>
+              <a:t>E</a:t>
+            </a:r>
+            <a:r>
               <a:rPr lang="de-DE" dirty="0"/>
-              <a:t>Eingabe</a:t>
+              <a:t>ingabe</a:t>
             </a:r>
           </a:p>
         </p:txBody>
@@ -6362,8 +7084,12 @@
           <a:p>
             <a:pPr algn="ctr"/>
             <a:r>
+              <a:rPr lang="de-DE" b="1" dirty="0"/>
+              <a:t>V</a:t>
+            </a:r>
+            <a:r>
               <a:rPr lang="de-DE" dirty="0"/>
-              <a:t>Verarbeitung</a:t>
+              <a:t>erarbeitung</a:t>
             </a:r>
           </a:p>
         </p:txBody>
@@ -6409,8 +7135,12 @@
           <a:p>
             <a:pPr algn="ctr"/>
             <a:r>
+              <a:rPr lang="de-DE" b="1" dirty="0"/>
+              <a:t>A</a:t>
+            </a:r>
+            <a:r>
               <a:rPr lang="de-DE" dirty="0"/>
-              <a:t>Ausgabe</a:t>
+              <a:t>usgabe</a:t>
             </a:r>
           </a:p>
         </p:txBody>
@@ -7161,7 +7891,7 @@
           <a:lstStyle/>
           <a:p>
             <a:pPr algn="ctr"/>
-            <a:endParaRPr lang="de-DE"/>
+            <a:endParaRPr lang="de-DE" dirty="0"/>
           </a:p>
         </p:txBody>
       </p:sp>
@@ -7205,7 +7935,7 @@
           <a:lstStyle/>
           <a:p>
             <a:pPr algn="ctr"/>
-            <a:endParaRPr lang="de-DE"/>
+            <a:endParaRPr lang="de-DE" dirty="0"/>
           </a:p>
         </p:txBody>
       </p:sp>
@@ -7249,7 +7979,11 @@
           <a:lstStyle/>
           <a:p>
             <a:pPr algn="ctr"/>
-            <a:endParaRPr lang="de-DE"/>
+            <a:endParaRPr lang="de-DE" dirty="0">
+              <a:solidFill>
+                <a:schemeClr val="tx1"/>
+              </a:solidFill>
+            </a:endParaRPr>
           </a:p>
         </p:txBody>
       </p:sp>
@@ -7293,7 +8027,7 @@
           <a:lstStyle/>
           <a:p>
             <a:pPr algn="ctr"/>
-            <a:endParaRPr lang="de-DE"/>
+            <a:endParaRPr lang="de-DE" dirty="0"/>
           </a:p>
         </p:txBody>
       </p:sp>
@@ -7789,7 +8523,7 @@
               <a:rPr lang="de-DE" dirty="0">
                 <a:latin typeface="Trebuchet MS" panose="020B0703020202090204" pitchFamily="34" charset="0"/>
               </a:rPr>
-              <a:t>Probiert‘s aus! 😄</a:t>
+              <a:t>Probiert‘s aus! An die Laptops… 😄</a:t>
             </a:r>
             <a:endParaRPr b="0" dirty="0">
               <a:latin typeface="Trebuchet MS" panose="020B0703020202090204" pitchFamily="34" charset="0"/>
@@ -7831,6 +8565,179 @@
                                     <p:set>
                                       <p:cBhvr>
                                         <p:cTn id="6" dur="1" fill="hold">
+                                          <p:stCondLst>
+                                            <p:cond delay="0"/>
+                                          </p:stCondLst>
+                                        </p:cTn>
+                                        <p:tgtEl>
+                                          <p:spTgt spid="3">
+                                            <p:txEl>
+                                              <p:pRg st="0" end="0"/>
+                                            </p:txEl>
+                                          </p:spTgt>
+                                        </p:tgtEl>
+                                        <p:attrNameLst>
+                                          <p:attrName>style.visibility</p:attrName>
+                                        </p:attrNameLst>
+                                      </p:cBhvr>
+                                      <p:to>
+                                        <p:strVal val="visible"/>
+                                      </p:to>
+                                    </p:set>
+                                  </p:childTnLst>
+                                </p:cTn>
+                              </p:par>
+                              <p:par>
+                                <p:cTn id="7" presetID="1" presetClass="entr" presetSubtype="0" fill="hold" nodeType="withEffect">
+                                  <p:stCondLst>
+                                    <p:cond delay="0"/>
+                                  </p:stCondLst>
+                                  <p:childTnLst>
+                                    <p:set>
+                                      <p:cBhvr>
+                                        <p:cTn id="8" dur="1" fill="hold">
+                                          <p:stCondLst>
+                                            <p:cond delay="0"/>
+                                          </p:stCondLst>
+                                        </p:cTn>
+                                        <p:tgtEl>
+                                          <p:spTgt spid="3">
+                                            <p:txEl>
+                                              <p:pRg st="1" end="1"/>
+                                            </p:txEl>
+                                          </p:spTgt>
+                                        </p:tgtEl>
+                                        <p:attrNameLst>
+                                          <p:attrName>style.visibility</p:attrName>
+                                        </p:attrNameLst>
+                                      </p:cBhvr>
+                                      <p:to>
+                                        <p:strVal val="visible"/>
+                                      </p:to>
+                                    </p:set>
+                                  </p:childTnLst>
+                                </p:cTn>
+                              </p:par>
+                              <p:par>
+                                <p:cTn id="9" presetID="1" presetClass="entr" presetSubtype="0" fill="hold" nodeType="withEffect">
+                                  <p:stCondLst>
+                                    <p:cond delay="0"/>
+                                  </p:stCondLst>
+                                  <p:childTnLst>
+                                    <p:set>
+                                      <p:cBhvr>
+                                        <p:cTn id="10" dur="1" fill="hold">
+                                          <p:stCondLst>
+                                            <p:cond delay="0"/>
+                                          </p:stCondLst>
+                                        </p:cTn>
+                                        <p:tgtEl>
+                                          <p:spTgt spid="3">
+                                            <p:txEl>
+                                              <p:pRg st="2" end="2"/>
+                                            </p:txEl>
+                                          </p:spTgt>
+                                        </p:tgtEl>
+                                        <p:attrNameLst>
+                                          <p:attrName>style.visibility</p:attrName>
+                                        </p:attrNameLst>
+                                      </p:cBhvr>
+                                      <p:to>
+                                        <p:strVal val="visible"/>
+                                      </p:to>
+                                    </p:set>
+                                  </p:childTnLst>
+                                </p:cTn>
+                              </p:par>
+                              <p:par>
+                                <p:cTn id="11" presetID="1" presetClass="entr" presetSubtype="0" fill="hold" nodeType="withEffect">
+                                  <p:stCondLst>
+                                    <p:cond delay="0"/>
+                                  </p:stCondLst>
+                                  <p:childTnLst>
+                                    <p:set>
+                                      <p:cBhvr>
+                                        <p:cTn id="12" dur="1" fill="hold">
+                                          <p:stCondLst>
+                                            <p:cond delay="0"/>
+                                          </p:stCondLst>
+                                        </p:cTn>
+                                        <p:tgtEl>
+                                          <p:spTgt spid="3">
+                                            <p:txEl>
+                                              <p:pRg st="3" end="3"/>
+                                            </p:txEl>
+                                          </p:spTgt>
+                                        </p:tgtEl>
+                                        <p:attrNameLst>
+                                          <p:attrName>style.visibility</p:attrName>
+                                        </p:attrNameLst>
+                                      </p:cBhvr>
+                                      <p:to>
+                                        <p:strVal val="visible"/>
+                                      </p:to>
+                                    </p:set>
+                                  </p:childTnLst>
+                                </p:cTn>
+                              </p:par>
+                              <p:par>
+                                <p:cTn id="13" presetID="1" presetClass="entr" presetSubtype="0" fill="hold" nodeType="withEffect">
+                                  <p:stCondLst>
+                                    <p:cond delay="0"/>
+                                  </p:stCondLst>
+                                  <p:childTnLst>
+                                    <p:set>
+                                      <p:cBhvr>
+                                        <p:cTn id="14" dur="1" fill="hold">
+                                          <p:stCondLst>
+                                            <p:cond delay="0"/>
+                                          </p:stCondLst>
+                                        </p:cTn>
+                                        <p:tgtEl>
+                                          <p:spTgt spid="3">
+                                            <p:txEl>
+                                              <p:pRg st="4" end="4"/>
+                                            </p:txEl>
+                                          </p:spTgt>
+                                        </p:tgtEl>
+                                        <p:attrNameLst>
+                                          <p:attrName>style.visibility</p:attrName>
+                                        </p:attrNameLst>
+                                      </p:cBhvr>
+                                      <p:to>
+                                        <p:strVal val="visible"/>
+                                      </p:to>
+                                    </p:set>
+                                  </p:childTnLst>
+                                </p:cTn>
+                              </p:par>
+                            </p:childTnLst>
+                          </p:cTn>
+                        </p:par>
+                      </p:childTnLst>
+                    </p:cTn>
+                  </p:par>
+                  <p:par>
+                    <p:cTn id="15" fill="hold">
+                      <p:stCondLst>
+                        <p:cond delay="indefinite"/>
+                      </p:stCondLst>
+                      <p:childTnLst>
+                        <p:par>
+                          <p:cTn id="16" fill="hold">
+                            <p:stCondLst>
+                              <p:cond delay="0"/>
+                            </p:stCondLst>
+                            <p:childTnLst>
+                              <p:par>
+                                <p:cTn id="17" presetID="1" presetClass="entr" presetSubtype="0" fill="hold" nodeType="clickEffect">
+                                  <p:stCondLst>
+                                    <p:cond delay="0"/>
+                                  </p:stCondLst>
+                                  <p:childTnLst>
+                                    <p:set>
+                                      <p:cBhvr>
+                                        <p:cTn id="18" dur="1" fill="hold">
                                           <p:stCondLst>
                                             <p:cond delay="0"/>
                                           </p:stCondLst>

</xml_diff>